<commit_message>
update windows & road img
windows size : 500x700 -> 600x700
road : two edge lines -> one image(edge line + white line + yellow line + road)
</commit_message>
<xml_diff>
--- a/圖片素材.pptx
+++ b/圖片素材.pptx
@@ -104,6 +104,11 @@
       </a:defRPr>
     </a:lvl9pPr>
   </p:defaultTextStyle>
+  <p:extLst>
+    <p:ext uri="{EFAFB233-063F-42B5-8137-9DF3F51BA10A}">
+      <p15:sldGuideLst xmlns:p15="http://schemas.microsoft.com/office/powerpoint/2012/main"/>
+    </p:ext>
+  </p:extLst>
 </p:presentation>
 </file>
 
@@ -3321,6 +3326,52 @@
           <a:chExt cx="0" cy="0"/>
         </a:xfrm>
       </p:grpSpPr>
+      <p:sp>
+        <p:nvSpPr>
+          <p:cNvPr id="3" name="矩形 2">
+            <a:extLst>
+              <a:ext uri="{FF2B5EF4-FFF2-40B4-BE49-F238E27FC236}">
+                <a16:creationId xmlns:a16="http://schemas.microsoft.com/office/drawing/2014/main" id="{63AD4EB4-2729-4C36-BA3E-10F2230D64B4}"/>
+              </a:ext>
+            </a:extLst>
+          </p:cNvPr>
+          <p:cNvSpPr/>
+          <p:nvPr/>
+        </p:nvSpPr>
+        <p:spPr>
+          <a:xfrm>
+            <a:off x="8816511" y="1922002"/>
+            <a:ext cx="3162650" cy="5402511"/>
+          </a:xfrm>
+          <a:prstGeom prst="rect">
+            <a:avLst/>
+          </a:prstGeom>
+        </p:spPr>
+        <p:style>
+          <a:lnRef idx="2">
+            <a:schemeClr val="accent3">
+              <a:shade val="50000"/>
+            </a:schemeClr>
+          </a:lnRef>
+          <a:fillRef idx="1">
+            <a:schemeClr val="accent3"/>
+          </a:fillRef>
+          <a:effectRef idx="0">
+            <a:schemeClr val="accent3"/>
+          </a:effectRef>
+          <a:fontRef idx="minor">
+            <a:schemeClr val="lt1"/>
+          </a:fontRef>
+        </p:style>
+        <p:txBody>
+          <a:bodyPr rtlCol="0" anchor="ctr"/>
+          <a:lstStyle/>
+          <a:p>
+            <a:pPr algn="ctr"/>
+            <a:endParaRPr lang="zh-TW" altLang="en-US"/>
+          </a:p>
+        </p:txBody>
+      </p:sp>
       <p:pic>
         <p:nvPicPr>
           <p:cNvPr id="10" name="圖片 9">
@@ -3348,7 +3399,7 @@
         </p:blipFill>
         <p:spPr>
           <a:xfrm flipH="1">
-            <a:off x="7223319" y="930910"/>
+            <a:off x="6833550" y="1367397"/>
             <a:ext cx="458729" cy="5149092"/>
           </a:xfrm>
           <a:prstGeom prst="rect">
@@ -3756,246 +3807,6 @@
           <p:spPr>
             <a:xfrm>
               <a:off x="2995569" y="-11100017"/>
-              <a:ext cx="360000" cy="4040890"/>
-            </a:xfrm>
-            <a:prstGeom prst="rect">
-              <a:avLst/>
-            </a:prstGeom>
-          </p:spPr>
-        </p:pic>
-      </p:grpSp>
-      <p:grpSp>
-        <p:nvGrpSpPr>
-          <p:cNvPr id="40" name="群組 39">
-            <a:extLst>
-              <a:ext uri="{FF2B5EF4-FFF2-40B4-BE49-F238E27FC236}">
-                <a16:creationId xmlns:a16="http://schemas.microsoft.com/office/drawing/2014/main" id="{60354E67-E63A-4459-B114-214B96517528}"/>
-              </a:ext>
-            </a:extLst>
-          </p:cNvPr>
-          <p:cNvGrpSpPr>
-            <a:grpSpLocks noChangeAspect="1"/>
-          </p:cNvGrpSpPr>
-          <p:nvPr/>
-        </p:nvGrpSpPr>
-        <p:grpSpPr>
-          <a:xfrm>
-            <a:off x="5916000" y="0"/>
-            <a:ext cx="360000" cy="10001250"/>
-            <a:chOff x="5109444" y="-10052651"/>
-            <a:chExt cx="360000" cy="20204451"/>
-          </a:xfrm>
-        </p:grpSpPr>
-        <p:grpSp>
-          <p:nvGrpSpPr>
-            <p:cNvPr id="24" name="群組 23">
-              <a:extLst>
-                <a:ext uri="{FF2B5EF4-FFF2-40B4-BE49-F238E27FC236}">
-                  <a16:creationId xmlns:a16="http://schemas.microsoft.com/office/drawing/2014/main" id="{62FF0987-C499-4986-8C3B-87E3E0E384AE}"/>
-                </a:ext>
-              </a:extLst>
-            </p:cNvPr>
-            <p:cNvGrpSpPr/>
-            <p:nvPr/>
-          </p:nvGrpSpPr>
-          <p:grpSpPr>
-            <a:xfrm>
-              <a:off x="5109444" y="-10052651"/>
-              <a:ext cx="360000" cy="16163561"/>
-              <a:chOff x="2995569" y="-11100017"/>
-              <a:chExt cx="360000" cy="16163561"/>
-            </a:xfrm>
-          </p:grpSpPr>
-          <p:grpSp>
-            <p:nvGrpSpPr>
-              <p:cNvPr id="28" name="群組 27">
-                <a:extLst>
-                  <a:ext uri="{FF2B5EF4-FFF2-40B4-BE49-F238E27FC236}">
-                    <a16:creationId xmlns:a16="http://schemas.microsoft.com/office/drawing/2014/main" id="{DBF78589-1B0B-4F81-B81B-6F8EBF205937}"/>
-                  </a:ext>
-                </a:extLst>
-              </p:cNvPr>
-              <p:cNvGrpSpPr/>
-              <p:nvPr/>
-            </p:nvGrpSpPr>
-            <p:grpSpPr>
-              <a:xfrm>
-                <a:off x="2995569" y="-3018236"/>
-                <a:ext cx="360000" cy="8081780"/>
-                <a:chOff x="3317165" y="-839982"/>
-                <a:chExt cx="458729" cy="10298185"/>
-              </a:xfrm>
-            </p:grpSpPr>
-            <p:pic>
-              <p:nvPicPr>
-                <p:cNvPr id="36" name="圖片 35">
-                  <a:extLst>
-                    <a:ext uri="{FF2B5EF4-FFF2-40B4-BE49-F238E27FC236}">
-                      <a16:creationId xmlns:a16="http://schemas.microsoft.com/office/drawing/2014/main" id="{62481306-91F9-4367-A5FD-D0D42818E5DC}"/>
-                    </a:ext>
-                  </a:extLst>
-                </p:cNvPr>
-                <p:cNvPicPr>
-                  <a:picLocks noChangeAspect="1"/>
-                </p:cNvPicPr>
-                <p:nvPr/>
-              </p:nvPicPr>
-              <p:blipFill rotWithShape="1">
-                <a:blip r:embed="rId2">
-                  <a:extLst>
-                    <a:ext uri="{28A0092B-C50C-407E-A947-70E740481C1C}">
-                      <a14:useLocalDpi xmlns:a14="http://schemas.microsoft.com/office/drawing/2010/main" val="0"/>
-                    </a:ext>
-                  </a:extLst>
-                </a:blip>
-                <a:srcRect t="371" b="24548"/>
-                <a:stretch/>
-              </p:blipFill>
-              <p:spPr>
-                <a:xfrm>
-                  <a:off x="3317165" y="4309110"/>
-                  <a:ext cx="458729" cy="5149093"/>
-                </a:xfrm>
-                <a:prstGeom prst="rect">
-                  <a:avLst/>
-                </a:prstGeom>
-              </p:spPr>
-            </p:pic>
-            <p:pic>
-              <p:nvPicPr>
-                <p:cNvPr id="35" name="圖片 34">
-                  <a:extLst>
-                    <a:ext uri="{FF2B5EF4-FFF2-40B4-BE49-F238E27FC236}">
-                      <a16:creationId xmlns:a16="http://schemas.microsoft.com/office/drawing/2014/main" id="{E541E6B3-99E0-415B-90A5-96DBB3ED61C0}"/>
-                    </a:ext>
-                  </a:extLst>
-                </p:cNvPr>
-                <p:cNvPicPr>
-                  <a:picLocks noChangeAspect="1"/>
-                </p:cNvPicPr>
-                <p:nvPr/>
-              </p:nvPicPr>
-              <p:blipFill rotWithShape="1">
-                <a:blip r:embed="rId2">
-                  <a:extLst>
-                    <a:ext uri="{28A0092B-C50C-407E-A947-70E740481C1C}">
-                      <a14:useLocalDpi xmlns:a14="http://schemas.microsoft.com/office/drawing/2010/main" val="0"/>
-                    </a:ext>
-                  </a:extLst>
-                </a:blip>
-                <a:srcRect t="371" b="24548"/>
-                <a:stretch/>
-              </p:blipFill>
-              <p:spPr>
-                <a:xfrm>
-                  <a:off x="3317165" y="-839982"/>
-                  <a:ext cx="458729" cy="5149092"/>
-                </a:xfrm>
-                <a:prstGeom prst="rect">
-                  <a:avLst/>
-                </a:prstGeom>
-              </p:spPr>
-            </p:pic>
-          </p:grpSp>
-          <p:pic>
-            <p:nvPicPr>
-              <p:cNvPr id="26" name="圖片 25">
-                <a:extLst>
-                  <a:ext uri="{FF2B5EF4-FFF2-40B4-BE49-F238E27FC236}">
-                    <a16:creationId xmlns:a16="http://schemas.microsoft.com/office/drawing/2014/main" id="{487E31C1-39CA-4266-8369-8FD026A880FB}"/>
-                  </a:ext>
-                </a:extLst>
-              </p:cNvPr>
-              <p:cNvPicPr>
-                <a:picLocks noChangeAspect="1"/>
-              </p:cNvPicPr>
-              <p:nvPr/>
-            </p:nvPicPr>
-            <p:blipFill rotWithShape="1">
-              <a:blip r:embed="rId2">
-                <a:extLst>
-                  <a:ext uri="{28A0092B-C50C-407E-A947-70E740481C1C}">
-                    <a14:useLocalDpi xmlns:a14="http://schemas.microsoft.com/office/drawing/2010/main" val="0"/>
-                  </a:ext>
-                </a:extLst>
-              </a:blip>
-              <a:srcRect t="371" b="24548"/>
-              <a:stretch/>
-            </p:blipFill>
-            <p:spPr>
-              <a:xfrm>
-                <a:off x="2995569" y="-7059127"/>
-                <a:ext cx="360000" cy="4040890"/>
-              </a:xfrm>
-              <a:prstGeom prst="rect">
-                <a:avLst/>
-              </a:prstGeom>
-            </p:spPr>
-          </p:pic>
-          <p:pic>
-            <p:nvPicPr>
-              <p:cNvPr id="27" name="圖片 26">
-                <a:extLst>
-                  <a:ext uri="{FF2B5EF4-FFF2-40B4-BE49-F238E27FC236}">
-                    <a16:creationId xmlns:a16="http://schemas.microsoft.com/office/drawing/2014/main" id="{30734BB2-D24F-4F4E-B1B2-4ED02808DE28}"/>
-                  </a:ext>
-                </a:extLst>
-              </p:cNvPr>
-              <p:cNvPicPr>
-                <a:picLocks noChangeAspect="1"/>
-              </p:cNvPicPr>
-              <p:nvPr/>
-            </p:nvPicPr>
-            <p:blipFill rotWithShape="1">
-              <a:blip r:embed="rId2">
-                <a:extLst>
-                  <a:ext uri="{28A0092B-C50C-407E-A947-70E740481C1C}">
-                    <a14:useLocalDpi xmlns:a14="http://schemas.microsoft.com/office/drawing/2010/main" val="0"/>
-                  </a:ext>
-                </a:extLst>
-              </a:blip>
-              <a:srcRect t="371" b="24548"/>
-              <a:stretch/>
-            </p:blipFill>
-            <p:spPr>
-              <a:xfrm>
-                <a:off x="2995569" y="-11100017"/>
-                <a:ext cx="360000" cy="4040890"/>
-              </a:xfrm>
-              <a:prstGeom prst="rect">
-                <a:avLst/>
-              </a:prstGeom>
-            </p:spPr>
-          </p:pic>
-        </p:grpSp>
-        <p:pic>
-          <p:nvPicPr>
-            <p:cNvPr id="39" name="圖片 38">
-              <a:extLst>
-                <a:ext uri="{FF2B5EF4-FFF2-40B4-BE49-F238E27FC236}">
-                  <a16:creationId xmlns:a16="http://schemas.microsoft.com/office/drawing/2014/main" id="{9AE52826-B461-43E4-8B06-40FF6E30717F}"/>
-                </a:ext>
-              </a:extLst>
-            </p:cNvPr>
-            <p:cNvPicPr>
-              <a:picLocks noChangeAspect="1"/>
-            </p:cNvPicPr>
-            <p:nvPr/>
-          </p:nvPicPr>
-          <p:blipFill rotWithShape="1">
-            <a:blip r:embed="rId2">
-              <a:extLst>
-                <a:ext uri="{28A0092B-C50C-407E-A947-70E740481C1C}">
-                  <a14:useLocalDpi xmlns:a14="http://schemas.microsoft.com/office/drawing/2010/main" val="0"/>
-                </a:ext>
-              </a:extLst>
-            </a:blip>
-            <a:srcRect t="371" b="24548"/>
-            <a:stretch/>
-          </p:blipFill>
-          <p:spPr>
-            <a:xfrm>
-              <a:off x="5109444" y="6110910"/>
               <a:ext cx="360000" cy="4040890"/>
             </a:xfrm>
             <a:prstGeom prst="rect">
@@ -4505,6 +4316,2739 @@
           </p:spPr>
         </p:pic>
       </p:grpSp>
+      <p:grpSp>
+        <p:nvGrpSpPr>
+          <p:cNvPr id="84" name="群組 83">
+            <a:extLst>
+              <a:ext uri="{FF2B5EF4-FFF2-40B4-BE49-F238E27FC236}">
+                <a16:creationId xmlns:a16="http://schemas.microsoft.com/office/drawing/2014/main" id="{8E8C0E54-AD9E-43B7-8C0E-7DA57F00F598}"/>
+              </a:ext>
+            </a:extLst>
+          </p:cNvPr>
+          <p:cNvGrpSpPr/>
+          <p:nvPr/>
+        </p:nvGrpSpPr>
+        <p:grpSpPr>
+          <a:xfrm>
+            <a:off x="11854793" y="1075600"/>
+            <a:ext cx="248737" cy="5149092"/>
+            <a:chOff x="8242280" y="1367397"/>
+            <a:chExt cx="248737" cy="5149092"/>
+          </a:xfrm>
+        </p:grpSpPr>
+        <p:sp>
+          <p:nvSpPr>
+            <p:cNvPr id="85" name="矩形 84">
+              <a:extLst>
+                <a:ext uri="{FF2B5EF4-FFF2-40B4-BE49-F238E27FC236}">
+                  <a16:creationId xmlns:a16="http://schemas.microsoft.com/office/drawing/2014/main" id="{5C7C7589-2E5F-4885-ACAB-4E6D2445AF34}"/>
+                </a:ext>
+              </a:extLst>
+            </p:cNvPr>
+            <p:cNvSpPr/>
+            <p:nvPr/>
+          </p:nvSpPr>
+          <p:spPr>
+            <a:xfrm>
+              <a:off x="8242280" y="1367397"/>
+              <a:ext cx="248737" cy="2574875"/>
+            </a:xfrm>
+            <a:prstGeom prst="rect">
+              <a:avLst/>
+            </a:prstGeom>
+            <a:solidFill>
+              <a:schemeClr val="bg1"/>
+            </a:solidFill>
+            <a:ln>
+              <a:solidFill>
+                <a:schemeClr val="bg2"/>
+              </a:solidFill>
+            </a:ln>
+          </p:spPr>
+          <p:style>
+            <a:lnRef idx="2">
+              <a:schemeClr val="accent1">
+                <a:shade val="50000"/>
+              </a:schemeClr>
+            </a:lnRef>
+            <a:fillRef idx="1">
+              <a:schemeClr val="accent1"/>
+            </a:fillRef>
+            <a:effectRef idx="0">
+              <a:schemeClr val="accent1"/>
+            </a:effectRef>
+            <a:fontRef idx="minor">
+              <a:schemeClr val="lt1"/>
+            </a:fontRef>
+          </p:style>
+          <p:txBody>
+            <a:bodyPr rtlCol="0" anchor="ctr"/>
+            <a:lstStyle/>
+            <a:p>
+              <a:pPr algn="ctr"/>
+              <a:endParaRPr lang="zh-TW" altLang="en-US"/>
+            </a:p>
+          </p:txBody>
+        </p:sp>
+        <p:sp>
+          <p:nvSpPr>
+            <p:cNvPr id="86" name="矩形 85">
+              <a:extLst>
+                <a:ext uri="{FF2B5EF4-FFF2-40B4-BE49-F238E27FC236}">
+                  <a16:creationId xmlns:a16="http://schemas.microsoft.com/office/drawing/2014/main" id="{CD6E868F-48CC-4620-859F-8EF098BF56E9}"/>
+                </a:ext>
+              </a:extLst>
+            </p:cNvPr>
+            <p:cNvSpPr/>
+            <p:nvPr/>
+          </p:nvSpPr>
+          <p:spPr>
+            <a:xfrm>
+              <a:off x="8242280" y="3941614"/>
+              <a:ext cx="248737" cy="2574875"/>
+            </a:xfrm>
+            <a:prstGeom prst="rect">
+              <a:avLst/>
+            </a:prstGeom>
+            <a:noFill/>
+            <a:ln>
+              <a:noFill/>
+            </a:ln>
+          </p:spPr>
+          <p:style>
+            <a:lnRef idx="2">
+              <a:schemeClr val="accent1">
+                <a:shade val="50000"/>
+              </a:schemeClr>
+            </a:lnRef>
+            <a:fillRef idx="1">
+              <a:schemeClr val="accent1"/>
+            </a:fillRef>
+            <a:effectRef idx="0">
+              <a:schemeClr val="accent1"/>
+            </a:effectRef>
+            <a:fontRef idx="minor">
+              <a:schemeClr val="lt1"/>
+            </a:fontRef>
+          </p:style>
+          <p:txBody>
+            <a:bodyPr rtlCol="0" anchor="ctr"/>
+            <a:lstStyle/>
+            <a:p>
+              <a:pPr algn="ctr"/>
+              <a:endParaRPr lang="zh-TW" altLang="en-US"/>
+            </a:p>
+          </p:txBody>
+        </p:sp>
+      </p:grpSp>
+      <p:grpSp>
+        <p:nvGrpSpPr>
+          <p:cNvPr id="8" name="群組 7">
+            <a:extLst>
+              <a:ext uri="{FF2B5EF4-FFF2-40B4-BE49-F238E27FC236}">
+                <a16:creationId xmlns:a16="http://schemas.microsoft.com/office/drawing/2014/main" id="{8D6E4DB5-1EA5-4AFE-8DFE-2BB8A8E2B658}"/>
+              </a:ext>
+            </a:extLst>
+          </p:cNvPr>
+          <p:cNvGrpSpPr>
+            <a:grpSpLocks noChangeAspect="1"/>
+          </p:cNvGrpSpPr>
+          <p:nvPr/>
+        </p:nvGrpSpPr>
+        <p:grpSpPr>
+          <a:xfrm>
+            <a:off x="6059057" y="-432197"/>
+            <a:ext cx="73885" cy="11250000"/>
+            <a:chOff x="9350799" y="-9224558"/>
+            <a:chExt cx="304377" cy="46345776"/>
+          </a:xfrm>
+        </p:grpSpPr>
+        <p:grpSp>
+          <p:nvGrpSpPr>
+            <p:cNvPr id="7" name="群組 6">
+              <a:extLst>
+                <a:ext uri="{FF2B5EF4-FFF2-40B4-BE49-F238E27FC236}">
+                  <a16:creationId xmlns:a16="http://schemas.microsoft.com/office/drawing/2014/main" id="{F48F2480-5364-4D5D-825E-2C3C288AE64F}"/>
+                </a:ext>
+              </a:extLst>
+            </p:cNvPr>
+            <p:cNvGrpSpPr/>
+            <p:nvPr/>
+          </p:nvGrpSpPr>
+          <p:grpSpPr>
+            <a:xfrm>
+              <a:off x="9350799" y="6224692"/>
+              <a:ext cx="249105" cy="30896526"/>
+              <a:chOff x="8951824" y="-9223900"/>
+              <a:chExt cx="249105" cy="30896526"/>
+            </a:xfrm>
+          </p:grpSpPr>
+          <p:grpSp>
+            <p:nvGrpSpPr>
+              <p:cNvPr id="6" name="群組 5">
+                <a:extLst>
+                  <a:ext uri="{FF2B5EF4-FFF2-40B4-BE49-F238E27FC236}">
+                    <a16:creationId xmlns:a16="http://schemas.microsoft.com/office/drawing/2014/main" id="{FC0A8044-6FD9-4364-B0B7-1608A95BDC56}"/>
+                  </a:ext>
+                </a:extLst>
+              </p:cNvPr>
+              <p:cNvGrpSpPr/>
+              <p:nvPr/>
+            </p:nvGrpSpPr>
+            <p:grpSpPr>
+              <a:xfrm>
+                <a:off x="8951824" y="6224692"/>
+                <a:ext cx="248739" cy="15447934"/>
+                <a:chOff x="9466840" y="-2812408"/>
+                <a:chExt cx="248739" cy="15447934"/>
+              </a:xfrm>
+            </p:grpSpPr>
+            <p:grpSp>
+              <p:nvGrpSpPr>
+                <p:cNvPr id="5" name="群組 4">
+                  <a:extLst>
+                    <a:ext uri="{FF2B5EF4-FFF2-40B4-BE49-F238E27FC236}">
+                      <a16:creationId xmlns:a16="http://schemas.microsoft.com/office/drawing/2014/main" id="{6D745841-8909-4DB7-83FC-7A726F888566}"/>
+                    </a:ext>
+                  </a:extLst>
+                </p:cNvPr>
+                <p:cNvGrpSpPr/>
+                <p:nvPr/>
+              </p:nvGrpSpPr>
+              <p:grpSpPr>
+                <a:xfrm>
+                  <a:off x="9466841" y="2337342"/>
+                  <a:ext cx="248738" cy="10298184"/>
+                  <a:chOff x="7988402" y="-6700985"/>
+                  <a:chExt cx="248738" cy="10298184"/>
+                </a:xfrm>
+              </p:grpSpPr>
+              <p:grpSp>
+                <p:nvGrpSpPr>
+                  <p:cNvPr id="4" name="群組 3">
+                    <a:extLst>
+                      <a:ext uri="{FF2B5EF4-FFF2-40B4-BE49-F238E27FC236}">
+                        <a16:creationId xmlns:a16="http://schemas.microsoft.com/office/drawing/2014/main" id="{58E54A21-1460-4480-A267-6872A0459EBC}"/>
+                      </a:ext>
+                    </a:extLst>
+                  </p:cNvPr>
+                  <p:cNvGrpSpPr/>
+                  <p:nvPr/>
+                </p:nvGrpSpPr>
+                <p:grpSpPr>
+                  <a:xfrm>
+                    <a:off x="7988403" y="-1551893"/>
+                    <a:ext cx="248737" cy="5149092"/>
+                    <a:chOff x="8242280" y="1367397"/>
+                    <a:chExt cx="248737" cy="5149092"/>
+                  </a:xfrm>
+                </p:grpSpPr>
+                <p:sp>
+                  <p:nvSpPr>
+                    <p:cNvPr id="2" name="矩形 1">
+                      <a:extLst>
+                        <a:ext uri="{FF2B5EF4-FFF2-40B4-BE49-F238E27FC236}">
+                          <a16:creationId xmlns:a16="http://schemas.microsoft.com/office/drawing/2014/main" id="{E0A3C5CF-5908-48D9-97DD-B68081ADB6E9}"/>
+                        </a:ext>
+                      </a:extLst>
+                    </p:cNvPr>
+                    <p:cNvSpPr/>
+                    <p:nvPr/>
+                  </p:nvSpPr>
+                  <p:spPr>
+                    <a:xfrm>
+                      <a:off x="8242280" y="1367397"/>
+                      <a:ext cx="248737" cy="2574875"/>
+                    </a:xfrm>
+                    <a:prstGeom prst="rect">
+                      <a:avLst/>
+                    </a:prstGeom>
+                    <a:solidFill>
+                      <a:schemeClr val="bg1"/>
+                    </a:solidFill>
+                    <a:ln>
+                      <a:solidFill>
+                        <a:schemeClr val="bg2"/>
+                      </a:solidFill>
+                    </a:ln>
+                  </p:spPr>
+                  <p:style>
+                    <a:lnRef idx="2">
+                      <a:schemeClr val="accent1">
+                        <a:shade val="50000"/>
+                      </a:schemeClr>
+                    </a:lnRef>
+                    <a:fillRef idx="1">
+                      <a:schemeClr val="accent1"/>
+                    </a:fillRef>
+                    <a:effectRef idx="0">
+                      <a:schemeClr val="accent1"/>
+                    </a:effectRef>
+                    <a:fontRef idx="minor">
+                      <a:schemeClr val="lt1"/>
+                    </a:fontRef>
+                  </p:style>
+                  <p:txBody>
+                    <a:bodyPr rtlCol="0" anchor="ctr"/>
+                    <a:lstStyle/>
+                    <a:p>
+                      <a:pPr algn="ctr"/>
+                      <a:endParaRPr lang="zh-TW" altLang="en-US"/>
+                    </a:p>
+                  </p:txBody>
+                </p:sp>
+                <p:sp>
+                  <p:nvSpPr>
+                    <p:cNvPr id="58" name="矩形 57">
+                      <a:extLst>
+                        <a:ext uri="{FF2B5EF4-FFF2-40B4-BE49-F238E27FC236}">
+                          <a16:creationId xmlns:a16="http://schemas.microsoft.com/office/drawing/2014/main" id="{EAD1CE96-8620-4CC9-8BEA-C111DDE1F11F}"/>
+                        </a:ext>
+                      </a:extLst>
+                    </p:cNvPr>
+                    <p:cNvSpPr/>
+                    <p:nvPr/>
+                  </p:nvSpPr>
+                  <p:spPr>
+                    <a:xfrm>
+                      <a:off x="8242280" y="3941614"/>
+                      <a:ext cx="248737" cy="2574875"/>
+                    </a:xfrm>
+                    <a:prstGeom prst="rect">
+                      <a:avLst/>
+                    </a:prstGeom>
+                    <a:noFill/>
+                    <a:ln>
+                      <a:noFill/>
+                    </a:ln>
+                  </p:spPr>
+                  <p:style>
+                    <a:lnRef idx="2">
+                      <a:schemeClr val="accent1">
+                        <a:shade val="50000"/>
+                      </a:schemeClr>
+                    </a:lnRef>
+                    <a:fillRef idx="1">
+                      <a:schemeClr val="accent1"/>
+                    </a:fillRef>
+                    <a:effectRef idx="0">
+                      <a:schemeClr val="accent1"/>
+                    </a:effectRef>
+                    <a:fontRef idx="minor">
+                      <a:schemeClr val="lt1"/>
+                    </a:fontRef>
+                  </p:style>
+                  <p:txBody>
+                    <a:bodyPr rtlCol="0" anchor="ctr"/>
+                    <a:lstStyle/>
+                    <a:p>
+                      <a:pPr algn="ctr"/>
+                      <a:endParaRPr lang="zh-TW" altLang="en-US"/>
+                    </a:p>
+                  </p:txBody>
+                </p:sp>
+              </p:grpSp>
+              <p:grpSp>
+                <p:nvGrpSpPr>
+                  <p:cNvPr id="75" name="群組 74">
+                    <a:extLst>
+                      <a:ext uri="{FF2B5EF4-FFF2-40B4-BE49-F238E27FC236}">
+                        <a16:creationId xmlns:a16="http://schemas.microsoft.com/office/drawing/2014/main" id="{DD413FD9-7108-40E8-A540-0676878CED6B}"/>
+                      </a:ext>
+                    </a:extLst>
+                  </p:cNvPr>
+                  <p:cNvGrpSpPr/>
+                  <p:nvPr/>
+                </p:nvGrpSpPr>
+                <p:grpSpPr>
+                  <a:xfrm>
+                    <a:off x="7988402" y="-6700985"/>
+                    <a:ext cx="248737" cy="5149092"/>
+                    <a:chOff x="8242280" y="1367397"/>
+                    <a:chExt cx="248737" cy="5149092"/>
+                  </a:xfrm>
+                </p:grpSpPr>
+                <p:sp>
+                  <p:nvSpPr>
+                    <p:cNvPr id="76" name="矩形 75">
+                      <a:extLst>
+                        <a:ext uri="{FF2B5EF4-FFF2-40B4-BE49-F238E27FC236}">
+                          <a16:creationId xmlns:a16="http://schemas.microsoft.com/office/drawing/2014/main" id="{37C749A3-4D91-4771-B7AF-187E1795BB78}"/>
+                        </a:ext>
+                      </a:extLst>
+                    </p:cNvPr>
+                    <p:cNvSpPr/>
+                    <p:nvPr/>
+                  </p:nvSpPr>
+                  <p:spPr>
+                    <a:xfrm>
+                      <a:off x="8242280" y="1367397"/>
+                      <a:ext cx="248737" cy="2574875"/>
+                    </a:xfrm>
+                    <a:prstGeom prst="rect">
+                      <a:avLst/>
+                    </a:prstGeom>
+                    <a:solidFill>
+                      <a:schemeClr val="bg1"/>
+                    </a:solidFill>
+                    <a:ln>
+                      <a:solidFill>
+                        <a:schemeClr val="bg2"/>
+                      </a:solidFill>
+                    </a:ln>
+                  </p:spPr>
+                  <p:style>
+                    <a:lnRef idx="2">
+                      <a:schemeClr val="accent1">
+                        <a:shade val="50000"/>
+                      </a:schemeClr>
+                    </a:lnRef>
+                    <a:fillRef idx="1">
+                      <a:schemeClr val="accent1"/>
+                    </a:fillRef>
+                    <a:effectRef idx="0">
+                      <a:schemeClr val="accent1"/>
+                    </a:effectRef>
+                    <a:fontRef idx="minor">
+                      <a:schemeClr val="lt1"/>
+                    </a:fontRef>
+                  </p:style>
+                  <p:txBody>
+                    <a:bodyPr rtlCol="0" anchor="ctr"/>
+                    <a:lstStyle/>
+                    <a:p>
+                      <a:pPr algn="ctr"/>
+                      <a:endParaRPr lang="zh-TW" altLang="en-US"/>
+                    </a:p>
+                  </p:txBody>
+                </p:sp>
+                <p:sp>
+                  <p:nvSpPr>
+                    <p:cNvPr id="77" name="矩形 76">
+                      <a:extLst>
+                        <a:ext uri="{FF2B5EF4-FFF2-40B4-BE49-F238E27FC236}">
+                          <a16:creationId xmlns:a16="http://schemas.microsoft.com/office/drawing/2014/main" id="{1C78D936-8EB7-43F8-8218-FB689164D114}"/>
+                        </a:ext>
+                      </a:extLst>
+                    </p:cNvPr>
+                    <p:cNvSpPr/>
+                    <p:nvPr/>
+                  </p:nvSpPr>
+                  <p:spPr>
+                    <a:xfrm>
+                      <a:off x="8242280" y="3941614"/>
+                      <a:ext cx="248737" cy="2574875"/>
+                    </a:xfrm>
+                    <a:prstGeom prst="rect">
+                      <a:avLst/>
+                    </a:prstGeom>
+                    <a:noFill/>
+                    <a:ln>
+                      <a:noFill/>
+                    </a:ln>
+                  </p:spPr>
+                  <p:style>
+                    <a:lnRef idx="2">
+                      <a:schemeClr val="accent1">
+                        <a:shade val="50000"/>
+                      </a:schemeClr>
+                    </a:lnRef>
+                    <a:fillRef idx="1">
+                      <a:schemeClr val="accent1"/>
+                    </a:fillRef>
+                    <a:effectRef idx="0">
+                      <a:schemeClr val="accent1"/>
+                    </a:effectRef>
+                    <a:fontRef idx="minor">
+                      <a:schemeClr val="lt1"/>
+                    </a:fontRef>
+                  </p:style>
+                  <p:txBody>
+                    <a:bodyPr rtlCol="0" anchor="ctr"/>
+                    <a:lstStyle/>
+                    <a:p>
+                      <a:pPr algn="ctr"/>
+                      <a:endParaRPr lang="zh-TW" altLang="en-US"/>
+                    </a:p>
+                  </p:txBody>
+                </p:sp>
+              </p:grpSp>
+            </p:grpSp>
+            <p:grpSp>
+              <p:nvGrpSpPr>
+                <p:cNvPr id="78" name="群組 77">
+                  <a:extLst>
+                    <a:ext uri="{FF2B5EF4-FFF2-40B4-BE49-F238E27FC236}">
+                      <a16:creationId xmlns:a16="http://schemas.microsoft.com/office/drawing/2014/main" id="{41E375A8-0223-4D37-87B2-E01A9951E6E2}"/>
+                    </a:ext>
+                  </a:extLst>
+                </p:cNvPr>
+                <p:cNvGrpSpPr/>
+                <p:nvPr/>
+              </p:nvGrpSpPr>
+              <p:grpSpPr>
+                <a:xfrm>
+                  <a:off x="9466840" y="-2812408"/>
+                  <a:ext cx="248737" cy="5149092"/>
+                  <a:chOff x="8242280" y="1367397"/>
+                  <a:chExt cx="248737" cy="5149092"/>
+                </a:xfrm>
+              </p:grpSpPr>
+              <p:sp>
+                <p:nvSpPr>
+                  <p:cNvPr id="79" name="矩形 78">
+                    <a:extLst>
+                      <a:ext uri="{FF2B5EF4-FFF2-40B4-BE49-F238E27FC236}">
+                        <a16:creationId xmlns:a16="http://schemas.microsoft.com/office/drawing/2014/main" id="{1E295B67-B054-412C-B5C3-409FF473DFE9}"/>
+                      </a:ext>
+                    </a:extLst>
+                  </p:cNvPr>
+                  <p:cNvSpPr/>
+                  <p:nvPr/>
+                </p:nvSpPr>
+                <p:spPr>
+                  <a:xfrm>
+                    <a:off x="8242280" y="1367397"/>
+                    <a:ext cx="248737" cy="2574875"/>
+                  </a:xfrm>
+                  <a:prstGeom prst="rect">
+                    <a:avLst/>
+                  </a:prstGeom>
+                  <a:solidFill>
+                    <a:schemeClr val="bg1"/>
+                  </a:solidFill>
+                  <a:ln>
+                    <a:solidFill>
+                      <a:schemeClr val="bg2"/>
+                    </a:solidFill>
+                  </a:ln>
+                </p:spPr>
+                <p:style>
+                  <a:lnRef idx="2">
+                    <a:schemeClr val="accent1">
+                      <a:shade val="50000"/>
+                    </a:schemeClr>
+                  </a:lnRef>
+                  <a:fillRef idx="1">
+                    <a:schemeClr val="accent1"/>
+                  </a:fillRef>
+                  <a:effectRef idx="0">
+                    <a:schemeClr val="accent1"/>
+                  </a:effectRef>
+                  <a:fontRef idx="minor">
+                    <a:schemeClr val="lt1"/>
+                  </a:fontRef>
+                </p:style>
+                <p:txBody>
+                  <a:bodyPr rtlCol="0" anchor="ctr"/>
+                  <a:lstStyle/>
+                  <a:p>
+                    <a:pPr algn="ctr"/>
+                    <a:endParaRPr lang="zh-TW" altLang="en-US"/>
+                  </a:p>
+                </p:txBody>
+              </p:sp>
+              <p:sp>
+                <p:nvSpPr>
+                  <p:cNvPr id="80" name="矩形 79">
+                    <a:extLst>
+                      <a:ext uri="{FF2B5EF4-FFF2-40B4-BE49-F238E27FC236}">
+                        <a16:creationId xmlns:a16="http://schemas.microsoft.com/office/drawing/2014/main" id="{B82DC6B8-BCFA-4046-9762-491E8554C56A}"/>
+                      </a:ext>
+                    </a:extLst>
+                  </p:cNvPr>
+                  <p:cNvSpPr/>
+                  <p:nvPr/>
+                </p:nvSpPr>
+                <p:spPr>
+                  <a:xfrm>
+                    <a:off x="8242280" y="3941614"/>
+                    <a:ext cx="248737" cy="2574875"/>
+                  </a:xfrm>
+                  <a:prstGeom prst="rect">
+                    <a:avLst/>
+                  </a:prstGeom>
+                  <a:noFill/>
+                  <a:ln>
+                    <a:noFill/>
+                  </a:ln>
+                </p:spPr>
+                <p:style>
+                  <a:lnRef idx="2">
+                    <a:schemeClr val="accent1">
+                      <a:shade val="50000"/>
+                    </a:schemeClr>
+                  </a:lnRef>
+                  <a:fillRef idx="1">
+                    <a:schemeClr val="accent1"/>
+                  </a:fillRef>
+                  <a:effectRef idx="0">
+                    <a:schemeClr val="accent1"/>
+                  </a:effectRef>
+                  <a:fontRef idx="minor">
+                    <a:schemeClr val="lt1"/>
+                  </a:fontRef>
+                </p:style>
+                <p:txBody>
+                  <a:bodyPr rtlCol="0" anchor="ctr"/>
+                  <a:lstStyle/>
+                  <a:p>
+                    <a:pPr algn="ctr"/>
+                    <a:endParaRPr lang="zh-TW" altLang="en-US"/>
+                  </a:p>
+                </p:txBody>
+              </p:sp>
+            </p:grpSp>
+          </p:grpSp>
+          <p:grpSp>
+            <p:nvGrpSpPr>
+              <p:cNvPr id="87" name="群組 86">
+                <a:extLst>
+                  <a:ext uri="{FF2B5EF4-FFF2-40B4-BE49-F238E27FC236}">
+                    <a16:creationId xmlns:a16="http://schemas.microsoft.com/office/drawing/2014/main" id="{56DBAEBA-6127-4A9D-83A1-4B48C137BA67}"/>
+                  </a:ext>
+                </a:extLst>
+              </p:cNvPr>
+              <p:cNvGrpSpPr/>
+              <p:nvPr/>
+            </p:nvGrpSpPr>
+            <p:grpSpPr>
+              <a:xfrm>
+                <a:off x="8952190" y="-9223900"/>
+                <a:ext cx="248739" cy="15447934"/>
+                <a:chOff x="9466840" y="-2812408"/>
+                <a:chExt cx="248739" cy="15447934"/>
+              </a:xfrm>
+            </p:grpSpPr>
+            <p:grpSp>
+              <p:nvGrpSpPr>
+                <p:cNvPr id="88" name="群組 87">
+                  <a:extLst>
+                    <a:ext uri="{FF2B5EF4-FFF2-40B4-BE49-F238E27FC236}">
+                      <a16:creationId xmlns:a16="http://schemas.microsoft.com/office/drawing/2014/main" id="{63A81671-1236-4A3B-ABAA-61B157358C6F}"/>
+                    </a:ext>
+                  </a:extLst>
+                </p:cNvPr>
+                <p:cNvGrpSpPr/>
+                <p:nvPr/>
+              </p:nvGrpSpPr>
+              <p:grpSpPr>
+                <a:xfrm>
+                  <a:off x="9466841" y="2337342"/>
+                  <a:ext cx="248738" cy="10298184"/>
+                  <a:chOff x="7988402" y="-6700985"/>
+                  <a:chExt cx="248738" cy="10298184"/>
+                </a:xfrm>
+              </p:grpSpPr>
+              <p:grpSp>
+                <p:nvGrpSpPr>
+                  <p:cNvPr id="92" name="群組 91">
+                    <a:extLst>
+                      <a:ext uri="{FF2B5EF4-FFF2-40B4-BE49-F238E27FC236}">
+                        <a16:creationId xmlns:a16="http://schemas.microsoft.com/office/drawing/2014/main" id="{57160D23-3BE7-4246-B7B2-3692288D89D4}"/>
+                      </a:ext>
+                    </a:extLst>
+                  </p:cNvPr>
+                  <p:cNvGrpSpPr/>
+                  <p:nvPr/>
+                </p:nvGrpSpPr>
+                <p:grpSpPr>
+                  <a:xfrm>
+                    <a:off x="7988403" y="-1551893"/>
+                    <a:ext cx="248737" cy="5149092"/>
+                    <a:chOff x="8242280" y="1367397"/>
+                    <a:chExt cx="248737" cy="5149092"/>
+                  </a:xfrm>
+                </p:grpSpPr>
+                <p:sp>
+                  <p:nvSpPr>
+                    <p:cNvPr id="96" name="矩形 95">
+                      <a:extLst>
+                        <a:ext uri="{FF2B5EF4-FFF2-40B4-BE49-F238E27FC236}">
+                          <a16:creationId xmlns:a16="http://schemas.microsoft.com/office/drawing/2014/main" id="{57C6D9F1-57D5-403E-94DE-2AF07FB11623}"/>
+                        </a:ext>
+                      </a:extLst>
+                    </p:cNvPr>
+                    <p:cNvSpPr/>
+                    <p:nvPr/>
+                  </p:nvSpPr>
+                  <p:spPr>
+                    <a:xfrm>
+                      <a:off x="8242280" y="1367397"/>
+                      <a:ext cx="248737" cy="2574875"/>
+                    </a:xfrm>
+                    <a:prstGeom prst="rect">
+                      <a:avLst/>
+                    </a:prstGeom>
+                    <a:solidFill>
+                      <a:schemeClr val="bg1"/>
+                    </a:solidFill>
+                    <a:ln>
+                      <a:solidFill>
+                        <a:schemeClr val="bg2"/>
+                      </a:solidFill>
+                    </a:ln>
+                  </p:spPr>
+                  <p:style>
+                    <a:lnRef idx="2">
+                      <a:schemeClr val="accent1">
+                        <a:shade val="50000"/>
+                      </a:schemeClr>
+                    </a:lnRef>
+                    <a:fillRef idx="1">
+                      <a:schemeClr val="accent1"/>
+                    </a:fillRef>
+                    <a:effectRef idx="0">
+                      <a:schemeClr val="accent1"/>
+                    </a:effectRef>
+                    <a:fontRef idx="minor">
+                      <a:schemeClr val="lt1"/>
+                    </a:fontRef>
+                  </p:style>
+                  <p:txBody>
+                    <a:bodyPr rtlCol="0" anchor="ctr"/>
+                    <a:lstStyle/>
+                    <a:p>
+                      <a:pPr algn="ctr"/>
+                      <a:endParaRPr lang="zh-TW" altLang="en-US"/>
+                    </a:p>
+                  </p:txBody>
+                </p:sp>
+                <p:sp>
+                  <p:nvSpPr>
+                    <p:cNvPr id="97" name="矩形 96">
+                      <a:extLst>
+                        <a:ext uri="{FF2B5EF4-FFF2-40B4-BE49-F238E27FC236}">
+                          <a16:creationId xmlns:a16="http://schemas.microsoft.com/office/drawing/2014/main" id="{28D31BAE-5659-4937-9350-E8B7C4D6D615}"/>
+                        </a:ext>
+                      </a:extLst>
+                    </p:cNvPr>
+                    <p:cNvSpPr/>
+                    <p:nvPr/>
+                  </p:nvSpPr>
+                  <p:spPr>
+                    <a:xfrm>
+                      <a:off x="8242280" y="3941614"/>
+                      <a:ext cx="248737" cy="2574875"/>
+                    </a:xfrm>
+                    <a:prstGeom prst="rect">
+                      <a:avLst/>
+                    </a:prstGeom>
+                    <a:noFill/>
+                    <a:ln>
+                      <a:noFill/>
+                    </a:ln>
+                  </p:spPr>
+                  <p:style>
+                    <a:lnRef idx="2">
+                      <a:schemeClr val="accent1">
+                        <a:shade val="50000"/>
+                      </a:schemeClr>
+                    </a:lnRef>
+                    <a:fillRef idx="1">
+                      <a:schemeClr val="accent1"/>
+                    </a:fillRef>
+                    <a:effectRef idx="0">
+                      <a:schemeClr val="accent1"/>
+                    </a:effectRef>
+                    <a:fontRef idx="minor">
+                      <a:schemeClr val="lt1"/>
+                    </a:fontRef>
+                  </p:style>
+                  <p:txBody>
+                    <a:bodyPr rtlCol="0" anchor="ctr"/>
+                    <a:lstStyle/>
+                    <a:p>
+                      <a:pPr algn="ctr"/>
+                      <a:endParaRPr lang="zh-TW" altLang="en-US"/>
+                    </a:p>
+                  </p:txBody>
+                </p:sp>
+              </p:grpSp>
+              <p:grpSp>
+                <p:nvGrpSpPr>
+                  <p:cNvPr id="93" name="群組 92">
+                    <a:extLst>
+                      <a:ext uri="{FF2B5EF4-FFF2-40B4-BE49-F238E27FC236}">
+                        <a16:creationId xmlns:a16="http://schemas.microsoft.com/office/drawing/2014/main" id="{6C669D7B-63E3-4355-BEB7-DAC3A868F17B}"/>
+                      </a:ext>
+                    </a:extLst>
+                  </p:cNvPr>
+                  <p:cNvGrpSpPr/>
+                  <p:nvPr/>
+                </p:nvGrpSpPr>
+                <p:grpSpPr>
+                  <a:xfrm>
+                    <a:off x="7988402" y="-6700985"/>
+                    <a:ext cx="248737" cy="5149092"/>
+                    <a:chOff x="8242280" y="1367397"/>
+                    <a:chExt cx="248737" cy="5149092"/>
+                  </a:xfrm>
+                </p:grpSpPr>
+                <p:sp>
+                  <p:nvSpPr>
+                    <p:cNvPr id="94" name="矩形 93">
+                      <a:extLst>
+                        <a:ext uri="{FF2B5EF4-FFF2-40B4-BE49-F238E27FC236}">
+                          <a16:creationId xmlns:a16="http://schemas.microsoft.com/office/drawing/2014/main" id="{04B2BD73-2054-4FF8-A060-C83CCC3266EB}"/>
+                        </a:ext>
+                      </a:extLst>
+                    </p:cNvPr>
+                    <p:cNvSpPr/>
+                    <p:nvPr/>
+                  </p:nvSpPr>
+                  <p:spPr>
+                    <a:xfrm>
+                      <a:off x="8242280" y="1367397"/>
+                      <a:ext cx="248737" cy="2574875"/>
+                    </a:xfrm>
+                    <a:prstGeom prst="rect">
+                      <a:avLst/>
+                    </a:prstGeom>
+                    <a:solidFill>
+                      <a:schemeClr val="bg1"/>
+                    </a:solidFill>
+                    <a:ln>
+                      <a:solidFill>
+                        <a:schemeClr val="bg2"/>
+                      </a:solidFill>
+                    </a:ln>
+                  </p:spPr>
+                  <p:style>
+                    <a:lnRef idx="2">
+                      <a:schemeClr val="accent1">
+                        <a:shade val="50000"/>
+                      </a:schemeClr>
+                    </a:lnRef>
+                    <a:fillRef idx="1">
+                      <a:schemeClr val="accent1"/>
+                    </a:fillRef>
+                    <a:effectRef idx="0">
+                      <a:schemeClr val="accent1"/>
+                    </a:effectRef>
+                    <a:fontRef idx="minor">
+                      <a:schemeClr val="lt1"/>
+                    </a:fontRef>
+                  </p:style>
+                  <p:txBody>
+                    <a:bodyPr rtlCol="0" anchor="ctr"/>
+                    <a:lstStyle/>
+                    <a:p>
+                      <a:pPr algn="ctr"/>
+                      <a:endParaRPr lang="zh-TW" altLang="en-US"/>
+                    </a:p>
+                  </p:txBody>
+                </p:sp>
+                <p:sp>
+                  <p:nvSpPr>
+                    <p:cNvPr id="95" name="矩形 94">
+                      <a:extLst>
+                        <a:ext uri="{FF2B5EF4-FFF2-40B4-BE49-F238E27FC236}">
+                          <a16:creationId xmlns:a16="http://schemas.microsoft.com/office/drawing/2014/main" id="{BA073226-CF95-477E-9357-62192CDE3A1B}"/>
+                        </a:ext>
+                      </a:extLst>
+                    </p:cNvPr>
+                    <p:cNvSpPr/>
+                    <p:nvPr/>
+                  </p:nvSpPr>
+                  <p:spPr>
+                    <a:xfrm>
+                      <a:off x="8242280" y="3941614"/>
+                      <a:ext cx="248737" cy="2574875"/>
+                    </a:xfrm>
+                    <a:prstGeom prst="rect">
+                      <a:avLst/>
+                    </a:prstGeom>
+                    <a:noFill/>
+                    <a:ln>
+                      <a:noFill/>
+                    </a:ln>
+                  </p:spPr>
+                  <p:style>
+                    <a:lnRef idx="2">
+                      <a:schemeClr val="accent1">
+                        <a:shade val="50000"/>
+                      </a:schemeClr>
+                    </a:lnRef>
+                    <a:fillRef idx="1">
+                      <a:schemeClr val="accent1"/>
+                    </a:fillRef>
+                    <a:effectRef idx="0">
+                      <a:schemeClr val="accent1"/>
+                    </a:effectRef>
+                    <a:fontRef idx="minor">
+                      <a:schemeClr val="lt1"/>
+                    </a:fontRef>
+                  </p:style>
+                  <p:txBody>
+                    <a:bodyPr rtlCol="0" anchor="ctr"/>
+                    <a:lstStyle/>
+                    <a:p>
+                      <a:pPr algn="ctr"/>
+                      <a:endParaRPr lang="zh-TW" altLang="en-US"/>
+                    </a:p>
+                  </p:txBody>
+                </p:sp>
+              </p:grpSp>
+            </p:grpSp>
+            <p:grpSp>
+              <p:nvGrpSpPr>
+                <p:cNvPr id="89" name="群組 88">
+                  <a:extLst>
+                    <a:ext uri="{FF2B5EF4-FFF2-40B4-BE49-F238E27FC236}">
+                      <a16:creationId xmlns:a16="http://schemas.microsoft.com/office/drawing/2014/main" id="{E51EB2A8-608B-45DF-BE04-98CF45E4D034}"/>
+                    </a:ext>
+                  </a:extLst>
+                </p:cNvPr>
+                <p:cNvGrpSpPr/>
+                <p:nvPr/>
+              </p:nvGrpSpPr>
+              <p:grpSpPr>
+                <a:xfrm>
+                  <a:off x="9466840" y="-2812408"/>
+                  <a:ext cx="248737" cy="5149092"/>
+                  <a:chOff x="8242280" y="1367397"/>
+                  <a:chExt cx="248737" cy="5149092"/>
+                </a:xfrm>
+              </p:grpSpPr>
+              <p:sp>
+                <p:nvSpPr>
+                  <p:cNvPr id="90" name="矩形 89">
+                    <a:extLst>
+                      <a:ext uri="{FF2B5EF4-FFF2-40B4-BE49-F238E27FC236}">
+                        <a16:creationId xmlns:a16="http://schemas.microsoft.com/office/drawing/2014/main" id="{14EB36F1-1517-4335-8F10-06D3B45EE14E}"/>
+                      </a:ext>
+                    </a:extLst>
+                  </p:cNvPr>
+                  <p:cNvSpPr/>
+                  <p:nvPr/>
+                </p:nvSpPr>
+                <p:spPr>
+                  <a:xfrm>
+                    <a:off x="8242280" y="1367397"/>
+                    <a:ext cx="248737" cy="2574875"/>
+                  </a:xfrm>
+                  <a:prstGeom prst="rect">
+                    <a:avLst/>
+                  </a:prstGeom>
+                  <a:solidFill>
+                    <a:schemeClr val="bg1"/>
+                  </a:solidFill>
+                  <a:ln>
+                    <a:solidFill>
+                      <a:schemeClr val="bg2"/>
+                    </a:solidFill>
+                  </a:ln>
+                </p:spPr>
+                <p:style>
+                  <a:lnRef idx="2">
+                    <a:schemeClr val="accent1">
+                      <a:shade val="50000"/>
+                    </a:schemeClr>
+                  </a:lnRef>
+                  <a:fillRef idx="1">
+                    <a:schemeClr val="accent1"/>
+                  </a:fillRef>
+                  <a:effectRef idx="0">
+                    <a:schemeClr val="accent1"/>
+                  </a:effectRef>
+                  <a:fontRef idx="minor">
+                    <a:schemeClr val="lt1"/>
+                  </a:fontRef>
+                </p:style>
+                <p:txBody>
+                  <a:bodyPr rtlCol="0" anchor="ctr"/>
+                  <a:lstStyle/>
+                  <a:p>
+                    <a:pPr algn="ctr"/>
+                    <a:endParaRPr lang="zh-TW" altLang="en-US"/>
+                  </a:p>
+                </p:txBody>
+              </p:sp>
+              <p:sp>
+                <p:nvSpPr>
+                  <p:cNvPr id="91" name="矩形 90">
+                    <a:extLst>
+                      <a:ext uri="{FF2B5EF4-FFF2-40B4-BE49-F238E27FC236}">
+                        <a16:creationId xmlns:a16="http://schemas.microsoft.com/office/drawing/2014/main" id="{94FA0E33-6BCB-42F4-93FA-7CB4EF480248}"/>
+                      </a:ext>
+                    </a:extLst>
+                  </p:cNvPr>
+                  <p:cNvSpPr/>
+                  <p:nvPr/>
+                </p:nvSpPr>
+                <p:spPr>
+                  <a:xfrm>
+                    <a:off x="8242280" y="3941614"/>
+                    <a:ext cx="248737" cy="2574875"/>
+                  </a:xfrm>
+                  <a:prstGeom prst="rect">
+                    <a:avLst/>
+                  </a:prstGeom>
+                  <a:noFill/>
+                  <a:ln>
+                    <a:noFill/>
+                  </a:ln>
+                </p:spPr>
+                <p:style>
+                  <a:lnRef idx="2">
+                    <a:schemeClr val="accent1">
+                      <a:shade val="50000"/>
+                    </a:schemeClr>
+                  </a:lnRef>
+                  <a:fillRef idx="1">
+                    <a:schemeClr val="accent1"/>
+                  </a:fillRef>
+                  <a:effectRef idx="0">
+                    <a:schemeClr val="accent1"/>
+                  </a:effectRef>
+                  <a:fontRef idx="minor">
+                    <a:schemeClr val="lt1"/>
+                  </a:fontRef>
+                </p:style>
+                <p:txBody>
+                  <a:bodyPr rtlCol="0" anchor="ctr"/>
+                  <a:lstStyle/>
+                  <a:p>
+                    <a:pPr algn="ctr"/>
+                    <a:endParaRPr lang="zh-TW" altLang="en-US"/>
+                  </a:p>
+                </p:txBody>
+              </p:sp>
+            </p:grpSp>
+          </p:grpSp>
+        </p:grpSp>
+        <p:grpSp>
+          <p:nvGrpSpPr>
+            <p:cNvPr id="98" name="群組 97">
+              <a:extLst>
+                <a:ext uri="{FF2B5EF4-FFF2-40B4-BE49-F238E27FC236}">
+                  <a16:creationId xmlns:a16="http://schemas.microsoft.com/office/drawing/2014/main" id="{A2BB282D-4CA0-45CA-AAE4-B1C3EB9BDFC1}"/>
+                </a:ext>
+              </a:extLst>
+            </p:cNvPr>
+            <p:cNvGrpSpPr/>
+            <p:nvPr/>
+          </p:nvGrpSpPr>
+          <p:grpSpPr>
+            <a:xfrm>
+              <a:off x="9406437" y="-9224558"/>
+              <a:ext cx="248739" cy="15447934"/>
+              <a:chOff x="9466840" y="-2812408"/>
+              <a:chExt cx="248739" cy="15447934"/>
+            </a:xfrm>
+          </p:grpSpPr>
+          <p:grpSp>
+            <p:nvGrpSpPr>
+              <p:cNvPr id="99" name="群組 98">
+                <a:extLst>
+                  <a:ext uri="{FF2B5EF4-FFF2-40B4-BE49-F238E27FC236}">
+                    <a16:creationId xmlns:a16="http://schemas.microsoft.com/office/drawing/2014/main" id="{57153D46-2B82-42C9-95CA-CF17BD8AED06}"/>
+                  </a:ext>
+                </a:extLst>
+              </p:cNvPr>
+              <p:cNvGrpSpPr/>
+              <p:nvPr/>
+            </p:nvGrpSpPr>
+            <p:grpSpPr>
+              <a:xfrm>
+                <a:off x="9466841" y="2337342"/>
+                <a:ext cx="248738" cy="10298184"/>
+                <a:chOff x="7988402" y="-6700985"/>
+                <a:chExt cx="248738" cy="10298184"/>
+              </a:xfrm>
+            </p:grpSpPr>
+            <p:grpSp>
+              <p:nvGrpSpPr>
+                <p:cNvPr id="103" name="群組 102">
+                  <a:extLst>
+                    <a:ext uri="{FF2B5EF4-FFF2-40B4-BE49-F238E27FC236}">
+                      <a16:creationId xmlns:a16="http://schemas.microsoft.com/office/drawing/2014/main" id="{C54B9315-88C3-418F-874A-1C8CDB42D73B}"/>
+                    </a:ext>
+                  </a:extLst>
+                </p:cNvPr>
+                <p:cNvGrpSpPr/>
+                <p:nvPr/>
+              </p:nvGrpSpPr>
+              <p:grpSpPr>
+                <a:xfrm>
+                  <a:off x="7988403" y="-1551893"/>
+                  <a:ext cx="248737" cy="5149092"/>
+                  <a:chOff x="8242280" y="1367397"/>
+                  <a:chExt cx="248737" cy="5149092"/>
+                </a:xfrm>
+              </p:grpSpPr>
+              <p:sp>
+                <p:nvSpPr>
+                  <p:cNvPr id="107" name="矩形 106">
+                    <a:extLst>
+                      <a:ext uri="{FF2B5EF4-FFF2-40B4-BE49-F238E27FC236}">
+                        <a16:creationId xmlns:a16="http://schemas.microsoft.com/office/drawing/2014/main" id="{C6D75FB4-9C07-43D8-9CC9-75914618BA29}"/>
+                      </a:ext>
+                    </a:extLst>
+                  </p:cNvPr>
+                  <p:cNvSpPr/>
+                  <p:nvPr/>
+                </p:nvSpPr>
+                <p:spPr>
+                  <a:xfrm>
+                    <a:off x="8242280" y="1367397"/>
+                    <a:ext cx="248737" cy="2574875"/>
+                  </a:xfrm>
+                  <a:prstGeom prst="rect">
+                    <a:avLst/>
+                  </a:prstGeom>
+                  <a:solidFill>
+                    <a:schemeClr val="bg1"/>
+                  </a:solidFill>
+                  <a:ln>
+                    <a:solidFill>
+                      <a:schemeClr val="bg2"/>
+                    </a:solidFill>
+                  </a:ln>
+                </p:spPr>
+                <p:style>
+                  <a:lnRef idx="2">
+                    <a:schemeClr val="accent1">
+                      <a:shade val="50000"/>
+                    </a:schemeClr>
+                  </a:lnRef>
+                  <a:fillRef idx="1">
+                    <a:schemeClr val="accent1"/>
+                  </a:fillRef>
+                  <a:effectRef idx="0">
+                    <a:schemeClr val="accent1"/>
+                  </a:effectRef>
+                  <a:fontRef idx="minor">
+                    <a:schemeClr val="lt1"/>
+                  </a:fontRef>
+                </p:style>
+                <p:txBody>
+                  <a:bodyPr rtlCol="0" anchor="ctr"/>
+                  <a:lstStyle/>
+                  <a:p>
+                    <a:pPr algn="ctr"/>
+                    <a:endParaRPr lang="zh-TW" altLang="en-US"/>
+                  </a:p>
+                </p:txBody>
+              </p:sp>
+              <p:sp>
+                <p:nvSpPr>
+                  <p:cNvPr id="108" name="矩形 107">
+                    <a:extLst>
+                      <a:ext uri="{FF2B5EF4-FFF2-40B4-BE49-F238E27FC236}">
+                        <a16:creationId xmlns:a16="http://schemas.microsoft.com/office/drawing/2014/main" id="{C80ED689-8256-424F-87CF-7599BC771117}"/>
+                      </a:ext>
+                    </a:extLst>
+                  </p:cNvPr>
+                  <p:cNvSpPr/>
+                  <p:nvPr/>
+                </p:nvSpPr>
+                <p:spPr>
+                  <a:xfrm>
+                    <a:off x="8242280" y="3941614"/>
+                    <a:ext cx="248737" cy="2574875"/>
+                  </a:xfrm>
+                  <a:prstGeom prst="rect">
+                    <a:avLst/>
+                  </a:prstGeom>
+                  <a:noFill/>
+                  <a:ln>
+                    <a:noFill/>
+                  </a:ln>
+                </p:spPr>
+                <p:style>
+                  <a:lnRef idx="2">
+                    <a:schemeClr val="accent1">
+                      <a:shade val="50000"/>
+                    </a:schemeClr>
+                  </a:lnRef>
+                  <a:fillRef idx="1">
+                    <a:schemeClr val="accent1"/>
+                  </a:fillRef>
+                  <a:effectRef idx="0">
+                    <a:schemeClr val="accent1"/>
+                  </a:effectRef>
+                  <a:fontRef idx="minor">
+                    <a:schemeClr val="lt1"/>
+                  </a:fontRef>
+                </p:style>
+                <p:txBody>
+                  <a:bodyPr rtlCol="0" anchor="ctr"/>
+                  <a:lstStyle/>
+                  <a:p>
+                    <a:pPr algn="ctr"/>
+                    <a:endParaRPr lang="zh-TW" altLang="en-US"/>
+                  </a:p>
+                </p:txBody>
+              </p:sp>
+            </p:grpSp>
+            <p:grpSp>
+              <p:nvGrpSpPr>
+                <p:cNvPr id="104" name="群組 103">
+                  <a:extLst>
+                    <a:ext uri="{FF2B5EF4-FFF2-40B4-BE49-F238E27FC236}">
+                      <a16:creationId xmlns:a16="http://schemas.microsoft.com/office/drawing/2014/main" id="{0157E24A-BA9E-4236-AD0D-95F35247AFC8}"/>
+                    </a:ext>
+                  </a:extLst>
+                </p:cNvPr>
+                <p:cNvGrpSpPr/>
+                <p:nvPr/>
+              </p:nvGrpSpPr>
+              <p:grpSpPr>
+                <a:xfrm>
+                  <a:off x="7988402" y="-6700985"/>
+                  <a:ext cx="248737" cy="5149092"/>
+                  <a:chOff x="8242280" y="1367397"/>
+                  <a:chExt cx="248737" cy="5149092"/>
+                </a:xfrm>
+              </p:grpSpPr>
+              <p:sp>
+                <p:nvSpPr>
+                  <p:cNvPr id="105" name="矩形 104">
+                    <a:extLst>
+                      <a:ext uri="{FF2B5EF4-FFF2-40B4-BE49-F238E27FC236}">
+                        <a16:creationId xmlns:a16="http://schemas.microsoft.com/office/drawing/2014/main" id="{DCF84486-C8A3-4F68-A5FE-E1C1137F3AFC}"/>
+                      </a:ext>
+                    </a:extLst>
+                  </p:cNvPr>
+                  <p:cNvSpPr/>
+                  <p:nvPr/>
+                </p:nvSpPr>
+                <p:spPr>
+                  <a:xfrm>
+                    <a:off x="8242280" y="1367397"/>
+                    <a:ext cx="248737" cy="2574875"/>
+                  </a:xfrm>
+                  <a:prstGeom prst="rect">
+                    <a:avLst/>
+                  </a:prstGeom>
+                  <a:solidFill>
+                    <a:schemeClr val="bg1"/>
+                  </a:solidFill>
+                  <a:ln>
+                    <a:solidFill>
+                      <a:schemeClr val="bg2"/>
+                    </a:solidFill>
+                  </a:ln>
+                </p:spPr>
+                <p:style>
+                  <a:lnRef idx="2">
+                    <a:schemeClr val="accent1">
+                      <a:shade val="50000"/>
+                    </a:schemeClr>
+                  </a:lnRef>
+                  <a:fillRef idx="1">
+                    <a:schemeClr val="accent1"/>
+                  </a:fillRef>
+                  <a:effectRef idx="0">
+                    <a:schemeClr val="accent1"/>
+                  </a:effectRef>
+                  <a:fontRef idx="minor">
+                    <a:schemeClr val="lt1"/>
+                  </a:fontRef>
+                </p:style>
+                <p:txBody>
+                  <a:bodyPr rtlCol="0" anchor="ctr"/>
+                  <a:lstStyle/>
+                  <a:p>
+                    <a:pPr algn="ctr"/>
+                    <a:endParaRPr lang="zh-TW" altLang="en-US"/>
+                  </a:p>
+                </p:txBody>
+              </p:sp>
+              <p:sp>
+                <p:nvSpPr>
+                  <p:cNvPr id="106" name="矩形 105">
+                    <a:extLst>
+                      <a:ext uri="{FF2B5EF4-FFF2-40B4-BE49-F238E27FC236}">
+                        <a16:creationId xmlns:a16="http://schemas.microsoft.com/office/drawing/2014/main" id="{2CD301EA-ADC7-4A0F-AD5D-73DAB3CC4E4E}"/>
+                      </a:ext>
+                    </a:extLst>
+                  </p:cNvPr>
+                  <p:cNvSpPr/>
+                  <p:nvPr/>
+                </p:nvSpPr>
+                <p:spPr>
+                  <a:xfrm>
+                    <a:off x="8242280" y="3941614"/>
+                    <a:ext cx="248737" cy="2574875"/>
+                  </a:xfrm>
+                  <a:prstGeom prst="rect">
+                    <a:avLst/>
+                  </a:prstGeom>
+                  <a:noFill/>
+                  <a:ln>
+                    <a:noFill/>
+                  </a:ln>
+                </p:spPr>
+                <p:style>
+                  <a:lnRef idx="2">
+                    <a:schemeClr val="accent1">
+                      <a:shade val="50000"/>
+                    </a:schemeClr>
+                  </a:lnRef>
+                  <a:fillRef idx="1">
+                    <a:schemeClr val="accent1"/>
+                  </a:fillRef>
+                  <a:effectRef idx="0">
+                    <a:schemeClr val="accent1"/>
+                  </a:effectRef>
+                  <a:fontRef idx="minor">
+                    <a:schemeClr val="lt1"/>
+                  </a:fontRef>
+                </p:style>
+                <p:txBody>
+                  <a:bodyPr rtlCol="0" anchor="ctr"/>
+                  <a:lstStyle/>
+                  <a:p>
+                    <a:pPr algn="ctr"/>
+                    <a:endParaRPr lang="zh-TW" altLang="en-US"/>
+                  </a:p>
+                </p:txBody>
+              </p:sp>
+            </p:grpSp>
+          </p:grpSp>
+          <p:grpSp>
+            <p:nvGrpSpPr>
+              <p:cNvPr id="100" name="群組 99">
+                <a:extLst>
+                  <a:ext uri="{FF2B5EF4-FFF2-40B4-BE49-F238E27FC236}">
+                    <a16:creationId xmlns:a16="http://schemas.microsoft.com/office/drawing/2014/main" id="{A25CFE05-6A57-45A9-A385-D5043F7D5716}"/>
+                  </a:ext>
+                </a:extLst>
+              </p:cNvPr>
+              <p:cNvGrpSpPr/>
+              <p:nvPr/>
+            </p:nvGrpSpPr>
+            <p:grpSpPr>
+              <a:xfrm>
+                <a:off x="9466840" y="-2812408"/>
+                <a:ext cx="248737" cy="5149092"/>
+                <a:chOff x="8242280" y="1367397"/>
+                <a:chExt cx="248737" cy="5149092"/>
+              </a:xfrm>
+            </p:grpSpPr>
+            <p:sp>
+              <p:nvSpPr>
+                <p:cNvPr id="101" name="矩形 100">
+                  <a:extLst>
+                    <a:ext uri="{FF2B5EF4-FFF2-40B4-BE49-F238E27FC236}">
+                      <a16:creationId xmlns:a16="http://schemas.microsoft.com/office/drawing/2014/main" id="{D4BF2B41-F802-4534-8C70-D254964D9458}"/>
+                    </a:ext>
+                  </a:extLst>
+                </p:cNvPr>
+                <p:cNvSpPr/>
+                <p:nvPr/>
+              </p:nvSpPr>
+              <p:spPr>
+                <a:xfrm>
+                  <a:off x="8242280" y="1367397"/>
+                  <a:ext cx="248737" cy="2574875"/>
+                </a:xfrm>
+                <a:prstGeom prst="rect">
+                  <a:avLst/>
+                </a:prstGeom>
+                <a:solidFill>
+                  <a:schemeClr val="bg1"/>
+                </a:solidFill>
+                <a:ln>
+                  <a:solidFill>
+                    <a:schemeClr val="bg2"/>
+                  </a:solidFill>
+                </a:ln>
+              </p:spPr>
+              <p:style>
+                <a:lnRef idx="2">
+                  <a:schemeClr val="accent1">
+                    <a:shade val="50000"/>
+                  </a:schemeClr>
+                </a:lnRef>
+                <a:fillRef idx="1">
+                  <a:schemeClr val="accent1"/>
+                </a:fillRef>
+                <a:effectRef idx="0">
+                  <a:schemeClr val="accent1"/>
+                </a:effectRef>
+                <a:fontRef idx="minor">
+                  <a:schemeClr val="lt1"/>
+                </a:fontRef>
+              </p:style>
+              <p:txBody>
+                <a:bodyPr rtlCol="0" anchor="ctr"/>
+                <a:lstStyle/>
+                <a:p>
+                  <a:pPr algn="ctr"/>
+                  <a:endParaRPr lang="zh-TW" altLang="en-US"/>
+                </a:p>
+              </p:txBody>
+            </p:sp>
+            <p:sp>
+              <p:nvSpPr>
+                <p:cNvPr id="102" name="矩形 101">
+                  <a:extLst>
+                    <a:ext uri="{FF2B5EF4-FFF2-40B4-BE49-F238E27FC236}">
+                      <a16:creationId xmlns:a16="http://schemas.microsoft.com/office/drawing/2014/main" id="{0EDEBFB9-7135-4E68-A327-9D623C148E97}"/>
+                    </a:ext>
+                  </a:extLst>
+                </p:cNvPr>
+                <p:cNvSpPr/>
+                <p:nvPr/>
+              </p:nvSpPr>
+              <p:spPr>
+                <a:xfrm>
+                  <a:off x="8242280" y="3941614"/>
+                  <a:ext cx="248737" cy="2574875"/>
+                </a:xfrm>
+                <a:prstGeom prst="rect">
+                  <a:avLst/>
+                </a:prstGeom>
+                <a:noFill/>
+                <a:ln>
+                  <a:noFill/>
+                </a:ln>
+              </p:spPr>
+              <p:style>
+                <a:lnRef idx="2">
+                  <a:schemeClr val="accent1">
+                    <a:shade val="50000"/>
+                  </a:schemeClr>
+                </a:lnRef>
+                <a:fillRef idx="1">
+                  <a:schemeClr val="accent1"/>
+                </a:fillRef>
+                <a:effectRef idx="0">
+                  <a:schemeClr val="accent1"/>
+                </a:effectRef>
+                <a:fontRef idx="minor">
+                  <a:schemeClr val="lt1"/>
+                </a:fontRef>
+              </p:style>
+              <p:txBody>
+                <a:bodyPr rtlCol="0" anchor="ctr"/>
+                <a:lstStyle/>
+                <a:p>
+                  <a:pPr algn="ctr"/>
+                  <a:endParaRPr lang="zh-TW" altLang="en-US"/>
+                </a:p>
+              </p:txBody>
+            </p:sp>
+          </p:grpSp>
+        </p:grpSp>
+      </p:grpSp>
+      <p:grpSp>
+        <p:nvGrpSpPr>
+          <p:cNvPr id="109" name="群組 108">
+            <a:extLst>
+              <a:ext uri="{FF2B5EF4-FFF2-40B4-BE49-F238E27FC236}">
+                <a16:creationId xmlns:a16="http://schemas.microsoft.com/office/drawing/2014/main" id="{66195912-9D56-473F-8B58-E117728DF54D}"/>
+              </a:ext>
+            </a:extLst>
+          </p:cNvPr>
+          <p:cNvGrpSpPr>
+            <a:grpSpLocks noChangeAspect="1"/>
+          </p:cNvGrpSpPr>
+          <p:nvPr/>
+        </p:nvGrpSpPr>
+        <p:grpSpPr>
+          <a:xfrm>
+            <a:off x="7831676" y="-469026"/>
+            <a:ext cx="72119" cy="11249875"/>
+            <a:chOff x="9360097" y="-9225868"/>
+            <a:chExt cx="297101" cy="46345261"/>
+          </a:xfrm>
+        </p:grpSpPr>
+        <p:grpSp>
+          <p:nvGrpSpPr>
+            <p:cNvPr id="110" name="群組 109">
+              <a:extLst>
+                <a:ext uri="{FF2B5EF4-FFF2-40B4-BE49-F238E27FC236}">
+                  <a16:creationId xmlns:a16="http://schemas.microsoft.com/office/drawing/2014/main" id="{DF23DFC0-96C7-4556-8ABA-21091C969B83}"/>
+                </a:ext>
+              </a:extLst>
+            </p:cNvPr>
+            <p:cNvGrpSpPr/>
+            <p:nvPr/>
+          </p:nvGrpSpPr>
+          <p:grpSpPr>
+            <a:xfrm>
+              <a:off x="9360097" y="6223213"/>
+              <a:ext cx="291374" cy="30896180"/>
+              <a:chOff x="8961122" y="-9225379"/>
+              <a:chExt cx="291374" cy="30896180"/>
+            </a:xfrm>
+          </p:grpSpPr>
+          <p:grpSp>
+            <p:nvGrpSpPr>
+              <p:cNvPr id="122" name="群組 121">
+                <a:extLst>
+                  <a:ext uri="{FF2B5EF4-FFF2-40B4-BE49-F238E27FC236}">
+                    <a16:creationId xmlns:a16="http://schemas.microsoft.com/office/drawing/2014/main" id="{1EFCB76B-3111-4411-BC5F-5A4CD431082C}"/>
+                  </a:ext>
+                </a:extLst>
+              </p:cNvPr>
+              <p:cNvGrpSpPr/>
+              <p:nvPr/>
+            </p:nvGrpSpPr>
+            <p:grpSpPr>
+              <a:xfrm>
+                <a:off x="8961122" y="6226982"/>
+                <a:ext cx="252169" cy="15443819"/>
+                <a:chOff x="9476138" y="-2810118"/>
+                <a:chExt cx="252169" cy="15443819"/>
+              </a:xfrm>
+            </p:grpSpPr>
+            <p:grpSp>
+              <p:nvGrpSpPr>
+                <p:cNvPr id="134" name="群組 133">
+                  <a:extLst>
+                    <a:ext uri="{FF2B5EF4-FFF2-40B4-BE49-F238E27FC236}">
+                      <a16:creationId xmlns:a16="http://schemas.microsoft.com/office/drawing/2014/main" id="{1F5C9678-D335-4330-A015-E92454FBFADC}"/>
+                    </a:ext>
+                  </a:extLst>
+                </p:cNvPr>
+                <p:cNvGrpSpPr/>
+                <p:nvPr/>
+              </p:nvGrpSpPr>
+              <p:grpSpPr>
+                <a:xfrm>
+                  <a:off x="9476140" y="2336390"/>
+                  <a:ext cx="252167" cy="10297311"/>
+                  <a:chOff x="7997701" y="-6701937"/>
+                  <a:chExt cx="252167" cy="10297311"/>
+                </a:xfrm>
+              </p:grpSpPr>
+              <p:grpSp>
+                <p:nvGrpSpPr>
+                  <p:cNvPr id="138" name="群組 137">
+                    <a:extLst>
+                      <a:ext uri="{FF2B5EF4-FFF2-40B4-BE49-F238E27FC236}">
+                        <a16:creationId xmlns:a16="http://schemas.microsoft.com/office/drawing/2014/main" id="{7325D927-EB1F-4D1E-8088-B45FA38154DB}"/>
+                      </a:ext>
+                    </a:extLst>
+                  </p:cNvPr>
+                  <p:cNvGrpSpPr/>
+                  <p:nvPr/>
+                </p:nvGrpSpPr>
+                <p:grpSpPr>
+                  <a:xfrm>
+                    <a:off x="7997701" y="-1542027"/>
+                    <a:ext cx="251266" cy="5137401"/>
+                    <a:chOff x="8251578" y="1377263"/>
+                    <a:chExt cx="251266" cy="5137401"/>
+                  </a:xfrm>
+                </p:grpSpPr>
+                <p:sp>
+                  <p:nvSpPr>
+                    <p:cNvPr id="142" name="矩形 141">
+                      <a:extLst>
+                        <a:ext uri="{FF2B5EF4-FFF2-40B4-BE49-F238E27FC236}">
+                          <a16:creationId xmlns:a16="http://schemas.microsoft.com/office/drawing/2014/main" id="{DA3B9891-54D0-438F-A88C-9355C5576616}"/>
+                        </a:ext>
+                      </a:extLst>
+                    </p:cNvPr>
+                    <p:cNvSpPr/>
+                    <p:nvPr/>
+                  </p:nvSpPr>
+                  <p:spPr>
+                    <a:xfrm>
+                      <a:off x="8251578" y="1377263"/>
+                      <a:ext cx="248737" cy="2574876"/>
+                    </a:xfrm>
+                    <a:prstGeom prst="rect">
+                      <a:avLst/>
+                    </a:prstGeom>
+                    <a:solidFill>
+                      <a:schemeClr val="accent4"/>
+                    </a:solidFill>
+                    <a:ln>
+                      <a:solidFill>
+                        <a:schemeClr val="bg2"/>
+                      </a:solidFill>
+                    </a:ln>
+                  </p:spPr>
+                  <p:style>
+                    <a:lnRef idx="2">
+                      <a:schemeClr val="accent1">
+                        <a:shade val="50000"/>
+                      </a:schemeClr>
+                    </a:lnRef>
+                    <a:fillRef idx="1">
+                      <a:schemeClr val="accent1"/>
+                    </a:fillRef>
+                    <a:effectRef idx="0">
+                      <a:schemeClr val="accent1"/>
+                    </a:effectRef>
+                    <a:fontRef idx="minor">
+                      <a:schemeClr val="lt1"/>
+                    </a:fontRef>
+                  </p:style>
+                  <p:txBody>
+                    <a:bodyPr rtlCol="0" anchor="ctr"/>
+                    <a:lstStyle/>
+                    <a:p>
+                      <a:pPr algn="ctr"/>
+                      <a:endParaRPr lang="zh-TW" altLang="en-US"/>
+                    </a:p>
+                  </p:txBody>
+                </p:sp>
+                <p:sp>
+                  <p:nvSpPr>
+                    <p:cNvPr id="143" name="矩形 142">
+                      <a:extLst>
+                        <a:ext uri="{FF2B5EF4-FFF2-40B4-BE49-F238E27FC236}">
+                          <a16:creationId xmlns:a16="http://schemas.microsoft.com/office/drawing/2014/main" id="{D3A03341-5563-491B-AFB4-9B255AA04E64}"/>
+                        </a:ext>
+                      </a:extLst>
+                    </p:cNvPr>
+                    <p:cNvSpPr/>
+                    <p:nvPr/>
+                  </p:nvSpPr>
+                  <p:spPr>
+                    <a:xfrm>
+                      <a:off x="8254107" y="3939788"/>
+                      <a:ext cx="248737" cy="2574876"/>
+                    </a:xfrm>
+                    <a:prstGeom prst="rect">
+                      <a:avLst/>
+                    </a:prstGeom>
+                    <a:solidFill>
+                      <a:schemeClr val="accent4"/>
+                    </a:solidFill>
+                    <a:ln>
+                      <a:noFill/>
+                    </a:ln>
+                  </p:spPr>
+                  <p:style>
+                    <a:lnRef idx="2">
+                      <a:schemeClr val="accent1">
+                        <a:shade val="50000"/>
+                      </a:schemeClr>
+                    </a:lnRef>
+                    <a:fillRef idx="1">
+                      <a:schemeClr val="accent1"/>
+                    </a:fillRef>
+                    <a:effectRef idx="0">
+                      <a:schemeClr val="accent1"/>
+                    </a:effectRef>
+                    <a:fontRef idx="minor">
+                      <a:schemeClr val="lt1"/>
+                    </a:fontRef>
+                  </p:style>
+                  <p:txBody>
+                    <a:bodyPr rtlCol="0" anchor="ctr"/>
+                    <a:lstStyle/>
+                    <a:p>
+                      <a:pPr algn="ctr"/>
+                      <a:endParaRPr lang="zh-TW" altLang="en-US"/>
+                    </a:p>
+                  </p:txBody>
+                </p:sp>
+              </p:grpSp>
+              <p:grpSp>
+                <p:nvGrpSpPr>
+                  <p:cNvPr id="139" name="群組 138">
+                    <a:extLst>
+                      <a:ext uri="{FF2B5EF4-FFF2-40B4-BE49-F238E27FC236}">
+                        <a16:creationId xmlns:a16="http://schemas.microsoft.com/office/drawing/2014/main" id="{6A89529C-D62D-4980-8995-BF76C0C86467}"/>
+                      </a:ext>
+                    </a:extLst>
+                  </p:cNvPr>
+                  <p:cNvGrpSpPr/>
+                  <p:nvPr/>
+                </p:nvGrpSpPr>
+                <p:grpSpPr>
+                  <a:xfrm>
+                    <a:off x="8000229" y="-6701937"/>
+                    <a:ext cx="249639" cy="5149566"/>
+                    <a:chOff x="8254107" y="1366445"/>
+                    <a:chExt cx="249639" cy="5149566"/>
+                  </a:xfrm>
+                </p:grpSpPr>
+                <p:sp>
+                  <p:nvSpPr>
+                    <p:cNvPr id="140" name="矩形 139">
+                      <a:extLst>
+                        <a:ext uri="{FF2B5EF4-FFF2-40B4-BE49-F238E27FC236}">
+                          <a16:creationId xmlns:a16="http://schemas.microsoft.com/office/drawing/2014/main" id="{713FBB14-B45E-4684-BB96-C35FF8E61522}"/>
+                        </a:ext>
+                      </a:extLst>
+                    </p:cNvPr>
+                    <p:cNvSpPr/>
+                    <p:nvPr/>
+                  </p:nvSpPr>
+                  <p:spPr>
+                    <a:xfrm>
+                      <a:off x="8255009" y="1366445"/>
+                      <a:ext cx="248737" cy="2574876"/>
+                    </a:xfrm>
+                    <a:prstGeom prst="rect">
+                      <a:avLst/>
+                    </a:prstGeom>
+                    <a:solidFill>
+                      <a:schemeClr val="accent4"/>
+                    </a:solidFill>
+                    <a:ln>
+                      <a:solidFill>
+                        <a:schemeClr val="bg2"/>
+                      </a:solidFill>
+                    </a:ln>
+                  </p:spPr>
+                  <p:style>
+                    <a:lnRef idx="2">
+                      <a:schemeClr val="accent1">
+                        <a:shade val="50000"/>
+                      </a:schemeClr>
+                    </a:lnRef>
+                    <a:fillRef idx="1">
+                      <a:schemeClr val="accent1"/>
+                    </a:fillRef>
+                    <a:effectRef idx="0">
+                      <a:schemeClr val="accent1"/>
+                    </a:effectRef>
+                    <a:fontRef idx="minor">
+                      <a:schemeClr val="lt1"/>
+                    </a:fontRef>
+                  </p:style>
+                  <p:txBody>
+                    <a:bodyPr rtlCol="0" anchor="ctr"/>
+                    <a:lstStyle/>
+                    <a:p>
+                      <a:pPr algn="ctr"/>
+                      <a:endParaRPr lang="zh-TW" altLang="en-US"/>
+                    </a:p>
+                  </p:txBody>
+                </p:sp>
+                <p:sp>
+                  <p:nvSpPr>
+                    <p:cNvPr id="141" name="矩形 140">
+                      <a:extLst>
+                        <a:ext uri="{FF2B5EF4-FFF2-40B4-BE49-F238E27FC236}">
+                          <a16:creationId xmlns:a16="http://schemas.microsoft.com/office/drawing/2014/main" id="{084E525C-4B18-4506-82D8-FE9FA1C3F2E9}"/>
+                        </a:ext>
+                      </a:extLst>
+                    </p:cNvPr>
+                    <p:cNvSpPr/>
+                    <p:nvPr/>
+                  </p:nvSpPr>
+                  <p:spPr>
+                    <a:xfrm>
+                      <a:off x="8254107" y="3941135"/>
+                      <a:ext cx="248736" cy="2574876"/>
+                    </a:xfrm>
+                    <a:prstGeom prst="rect">
+                      <a:avLst/>
+                    </a:prstGeom>
+                    <a:solidFill>
+                      <a:schemeClr val="accent4"/>
+                    </a:solidFill>
+                    <a:ln>
+                      <a:noFill/>
+                    </a:ln>
+                  </p:spPr>
+                  <p:style>
+                    <a:lnRef idx="2">
+                      <a:schemeClr val="accent1">
+                        <a:shade val="50000"/>
+                      </a:schemeClr>
+                    </a:lnRef>
+                    <a:fillRef idx="1">
+                      <a:schemeClr val="accent1"/>
+                    </a:fillRef>
+                    <a:effectRef idx="0">
+                      <a:schemeClr val="accent1"/>
+                    </a:effectRef>
+                    <a:fontRef idx="minor">
+                      <a:schemeClr val="lt1"/>
+                    </a:fontRef>
+                  </p:style>
+                  <p:txBody>
+                    <a:bodyPr rtlCol="0" anchor="ctr"/>
+                    <a:lstStyle/>
+                    <a:p>
+                      <a:pPr algn="ctr"/>
+                      <a:endParaRPr lang="zh-TW" altLang="en-US"/>
+                    </a:p>
+                  </p:txBody>
+                </p:sp>
+              </p:grpSp>
+            </p:grpSp>
+            <p:grpSp>
+              <p:nvGrpSpPr>
+                <p:cNvPr id="135" name="群組 134">
+                  <a:extLst>
+                    <a:ext uri="{FF2B5EF4-FFF2-40B4-BE49-F238E27FC236}">
+                      <a16:creationId xmlns:a16="http://schemas.microsoft.com/office/drawing/2014/main" id="{78921982-474D-42E9-8FE4-2E9A5DCACF73}"/>
+                    </a:ext>
+                  </a:extLst>
+                </p:cNvPr>
+                <p:cNvGrpSpPr/>
+                <p:nvPr/>
+              </p:nvGrpSpPr>
+              <p:grpSpPr>
+                <a:xfrm>
+                  <a:off x="9476138" y="-2810118"/>
+                  <a:ext cx="248736" cy="5141340"/>
+                  <a:chOff x="8251578" y="1369687"/>
+                  <a:chExt cx="248736" cy="5141340"/>
+                </a:xfrm>
+              </p:grpSpPr>
+              <p:sp>
+                <p:nvSpPr>
+                  <p:cNvPr id="136" name="矩形 135">
+                    <a:extLst>
+                      <a:ext uri="{FF2B5EF4-FFF2-40B4-BE49-F238E27FC236}">
+                        <a16:creationId xmlns:a16="http://schemas.microsoft.com/office/drawing/2014/main" id="{7DC7B2C0-CDEC-4CFC-AAFE-DF3ACB90379B}"/>
+                      </a:ext>
+                    </a:extLst>
+                  </p:cNvPr>
+                  <p:cNvSpPr/>
+                  <p:nvPr/>
+                </p:nvSpPr>
+                <p:spPr>
+                  <a:xfrm>
+                    <a:off x="8251578" y="1369687"/>
+                    <a:ext cx="248736" cy="2574872"/>
+                  </a:xfrm>
+                  <a:prstGeom prst="rect">
+                    <a:avLst/>
+                  </a:prstGeom>
+                  <a:solidFill>
+                    <a:schemeClr val="accent4"/>
+                  </a:solidFill>
+                  <a:ln>
+                    <a:solidFill>
+                      <a:schemeClr val="bg2"/>
+                    </a:solidFill>
+                  </a:ln>
+                </p:spPr>
+                <p:style>
+                  <a:lnRef idx="2">
+                    <a:schemeClr val="accent1">
+                      <a:shade val="50000"/>
+                    </a:schemeClr>
+                  </a:lnRef>
+                  <a:fillRef idx="1">
+                    <a:schemeClr val="accent1"/>
+                  </a:fillRef>
+                  <a:effectRef idx="0">
+                    <a:schemeClr val="accent1"/>
+                  </a:effectRef>
+                  <a:fontRef idx="minor">
+                    <a:schemeClr val="lt1"/>
+                  </a:fontRef>
+                </p:style>
+                <p:txBody>
+                  <a:bodyPr rtlCol="0" anchor="ctr"/>
+                  <a:lstStyle/>
+                  <a:p>
+                    <a:pPr algn="ctr"/>
+                    <a:endParaRPr lang="zh-TW" altLang="en-US"/>
+                  </a:p>
+                </p:txBody>
+              </p:sp>
+              <p:sp>
+                <p:nvSpPr>
+                  <p:cNvPr id="137" name="矩形 136">
+                    <a:extLst>
+                      <a:ext uri="{FF2B5EF4-FFF2-40B4-BE49-F238E27FC236}">
+                        <a16:creationId xmlns:a16="http://schemas.microsoft.com/office/drawing/2014/main" id="{E2C2EBA0-B5C6-43B5-A150-962513119A7B}"/>
+                      </a:ext>
+                    </a:extLst>
+                  </p:cNvPr>
+                  <p:cNvSpPr/>
+                  <p:nvPr/>
+                </p:nvSpPr>
+                <p:spPr>
+                  <a:xfrm>
+                    <a:off x="8251578" y="3936153"/>
+                    <a:ext cx="248736" cy="2574874"/>
+                  </a:xfrm>
+                  <a:prstGeom prst="rect">
+                    <a:avLst/>
+                  </a:prstGeom>
+                  <a:solidFill>
+                    <a:schemeClr val="accent4"/>
+                  </a:solidFill>
+                  <a:ln>
+                    <a:noFill/>
+                  </a:ln>
+                </p:spPr>
+                <p:style>
+                  <a:lnRef idx="2">
+                    <a:schemeClr val="accent1">
+                      <a:shade val="50000"/>
+                    </a:schemeClr>
+                  </a:lnRef>
+                  <a:fillRef idx="1">
+                    <a:schemeClr val="accent1"/>
+                  </a:fillRef>
+                  <a:effectRef idx="0">
+                    <a:schemeClr val="accent1"/>
+                  </a:effectRef>
+                  <a:fontRef idx="minor">
+                    <a:schemeClr val="lt1"/>
+                  </a:fontRef>
+                </p:style>
+                <p:txBody>
+                  <a:bodyPr rtlCol="0" anchor="ctr"/>
+                  <a:lstStyle/>
+                  <a:p>
+                    <a:pPr algn="ctr"/>
+                    <a:endParaRPr lang="zh-TW" altLang="en-US"/>
+                  </a:p>
+                </p:txBody>
+              </p:sp>
+            </p:grpSp>
+          </p:grpSp>
+          <p:grpSp>
+            <p:nvGrpSpPr>
+              <p:cNvPr id="123" name="群組 122">
+                <a:extLst>
+                  <a:ext uri="{FF2B5EF4-FFF2-40B4-BE49-F238E27FC236}">
+                    <a16:creationId xmlns:a16="http://schemas.microsoft.com/office/drawing/2014/main" id="{13F50194-A652-468B-858A-B87C9EC2E6CB}"/>
+                  </a:ext>
+                </a:extLst>
+              </p:cNvPr>
+              <p:cNvGrpSpPr/>
+              <p:nvPr/>
+            </p:nvGrpSpPr>
+            <p:grpSpPr>
+              <a:xfrm>
+                <a:off x="8980720" y="-9225379"/>
+                <a:ext cx="271776" cy="15448997"/>
+                <a:chOff x="9495370" y="-2813887"/>
+                <a:chExt cx="271776" cy="15448997"/>
+              </a:xfrm>
+            </p:grpSpPr>
+            <p:grpSp>
+              <p:nvGrpSpPr>
+                <p:cNvPr id="124" name="群組 123">
+                  <a:extLst>
+                    <a:ext uri="{FF2B5EF4-FFF2-40B4-BE49-F238E27FC236}">
+                      <a16:creationId xmlns:a16="http://schemas.microsoft.com/office/drawing/2014/main" id="{8B05B78F-D887-4899-9632-879FFB043668}"/>
+                    </a:ext>
+                  </a:extLst>
+                </p:cNvPr>
+                <p:cNvGrpSpPr/>
+                <p:nvPr/>
+              </p:nvGrpSpPr>
+              <p:grpSpPr>
+                <a:xfrm>
+                  <a:off x="9495370" y="2335859"/>
+                  <a:ext cx="264370" cy="10299251"/>
+                  <a:chOff x="8016931" y="-6702468"/>
+                  <a:chExt cx="264370" cy="10299251"/>
+                </a:xfrm>
+              </p:grpSpPr>
+              <p:grpSp>
+                <p:nvGrpSpPr>
+                  <p:cNvPr id="128" name="群組 127">
+                    <a:extLst>
+                      <a:ext uri="{FF2B5EF4-FFF2-40B4-BE49-F238E27FC236}">
+                        <a16:creationId xmlns:a16="http://schemas.microsoft.com/office/drawing/2014/main" id="{5877049B-F41B-498F-A6D3-0CC1F1FD4693}"/>
+                      </a:ext>
+                    </a:extLst>
+                  </p:cNvPr>
+                  <p:cNvGrpSpPr/>
+                  <p:nvPr/>
+                </p:nvGrpSpPr>
+                <p:grpSpPr>
+                  <a:xfrm>
+                    <a:off x="8016931" y="-1552882"/>
+                    <a:ext cx="255386" cy="5149665"/>
+                    <a:chOff x="8270808" y="1366408"/>
+                    <a:chExt cx="255386" cy="5149665"/>
+                  </a:xfrm>
+                </p:grpSpPr>
+                <p:sp>
+                  <p:nvSpPr>
+                    <p:cNvPr id="132" name="矩形 131">
+                      <a:extLst>
+                        <a:ext uri="{FF2B5EF4-FFF2-40B4-BE49-F238E27FC236}">
+                          <a16:creationId xmlns:a16="http://schemas.microsoft.com/office/drawing/2014/main" id="{F3CB41A5-56E3-4B1E-8867-6EE8089756D5}"/>
+                        </a:ext>
+                      </a:extLst>
+                    </p:cNvPr>
+                    <p:cNvSpPr/>
+                    <p:nvPr/>
+                  </p:nvSpPr>
+                  <p:spPr>
+                    <a:xfrm>
+                      <a:off x="8270808" y="1366408"/>
+                      <a:ext cx="248737" cy="2574876"/>
+                    </a:xfrm>
+                    <a:prstGeom prst="rect">
+                      <a:avLst/>
+                    </a:prstGeom>
+                    <a:solidFill>
+                      <a:schemeClr val="accent4"/>
+                    </a:solidFill>
+                    <a:ln>
+                      <a:solidFill>
+                        <a:schemeClr val="bg2"/>
+                      </a:solidFill>
+                    </a:ln>
+                  </p:spPr>
+                  <p:style>
+                    <a:lnRef idx="2">
+                      <a:schemeClr val="accent1">
+                        <a:shade val="50000"/>
+                      </a:schemeClr>
+                    </a:lnRef>
+                    <a:fillRef idx="1">
+                      <a:schemeClr val="accent1"/>
+                    </a:fillRef>
+                    <a:effectRef idx="0">
+                      <a:schemeClr val="accent1"/>
+                    </a:effectRef>
+                    <a:fontRef idx="minor">
+                      <a:schemeClr val="lt1"/>
+                    </a:fontRef>
+                  </p:style>
+                  <p:txBody>
+                    <a:bodyPr rtlCol="0" anchor="ctr"/>
+                    <a:lstStyle/>
+                    <a:p>
+                      <a:pPr algn="ctr"/>
+                      <a:endParaRPr lang="zh-TW" altLang="en-US"/>
+                    </a:p>
+                  </p:txBody>
+                </p:sp>
+                <p:sp>
+                  <p:nvSpPr>
+                    <p:cNvPr id="133" name="矩形 132">
+                      <a:extLst>
+                        <a:ext uri="{FF2B5EF4-FFF2-40B4-BE49-F238E27FC236}">
+                          <a16:creationId xmlns:a16="http://schemas.microsoft.com/office/drawing/2014/main" id="{DEC47F99-8A08-45E2-91BE-62C451D549A5}"/>
+                        </a:ext>
+                      </a:extLst>
+                    </p:cNvPr>
+                    <p:cNvSpPr/>
+                    <p:nvPr/>
+                  </p:nvSpPr>
+                  <p:spPr>
+                    <a:xfrm>
+                      <a:off x="8277457" y="3941197"/>
+                      <a:ext cx="248737" cy="2574876"/>
+                    </a:xfrm>
+                    <a:prstGeom prst="rect">
+                      <a:avLst/>
+                    </a:prstGeom>
+                    <a:solidFill>
+                      <a:schemeClr val="accent4"/>
+                    </a:solidFill>
+                    <a:ln>
+                      <a:noFill/>
+                    </a:ln>
+                  </p:spPr>
+                  <p:style>
+                    <a:lnRef idx="2">
+                      <a:schemeClr val="accent1">
+                        <a:shade val="50000"/>
+                      </a:schemeClr>
+                    </a:lnRef>
+                    <a:fillRef idx="1">
+                      <a:schemeClr val="accent1"/>
+                    </a:fillRef>
+                    <a:effectRef idx="0">
+                      <a:schemeClr val="accent1"/>
+                    </a:effectRef>
+                    <a:fontRef idx="minor">
+                      <a:schemeClr val="lt1"/>
+                    </a:fontRef>
+                  </p:style>
+                  <p:txBody>
+                    <a:bodyPr rtlCol="0" anchor="ctr"/>
+                    <a:lstStyle/>
+                    <a:p>
+                      <a:pPr algn="ctr"/>
+                      <a:endParaRPr lang="zh-TW" altLang="en-US"/>
+                    </a:p>
+                  </p:txBody>
+                </p:sp>
+              </p:grpSp>
+              <p:grpSp>
+                <p:nvGrpSpPr>
+                  <p:cNvPr id="129" name="群組 128">
+                    <a:extLst>
+                      <a:ext uri="{FF2B5EF4-FFF2-40B4-BE49-F238E27FC236}">
+                        <a16:creationId xmlns:a16="http://schemas.microsoft.com/office/drawing/2014/main" id="{60115976-CF17-4B45-87A0-E08EB27AE770}"/>
+                      </a:ext>
+                    </a:extLst>
+                  </p:cNvPr>
+                  <p:cNvGrpSpPr/>
+                  <p:nvPr/>
+                </p:nvGrpSpPr>
+                <p:grpSpPr>
+                  <a:xfrm>
+                    <a:off x="8028860" y="-6702468"/>
+                    <a:ext cx="252441" cy="5149336"/>
+                    <a:chOff x="8282738" y="1365914"/>
+                    <a:chExt cx="252441" cy="5149336"/>
+                  </a:xfrm>
+                </p:grpSpPr>
+                <p:sp>
+                  <p:nvSpPr>
+                    <p:cNvPr id="130" name="矩形 129">
+                      <a:extLst>
+                        <a:ext uri="{FF2B5EF4-FFF2-40B4-BE49-F238E27FC236}">
+                          <a16:creationId xmlns:a16="http://schemas.microsoft.com/office/drawing/2014/main" id="{CFE23A88-09B3-44B1-BAEB-FD84880DD255}"/>
+                        </a:ext>
+                      </a:extLst>
+                    </p:cNvPr>
+                    <p:cNvSpPr/>
+                    <p:nvPr/>
+                  </p:nvSpPr>
+                  <p:spPr>
+                    <a:xfrm>
+                      <a:off x="8286442" y="1365914"/>
+                      <a:ext cx="248737" cy="2574876"/>
+                    </a:xfrm>
+                    <a:prstGeom prst="rect">
+                      <a:avLst/>
+                    </a:prstGeom>
+                    <a:solidFill>
+                      <a:schemeClr val="accent4"/>
+                    </a:solidFill>
+                    <a:ln>
+                      <a:solidFill>
+                        <a:schemeClr val="bg2"/>
+                      </a:solidFill>
+                    </a:ln>
+                  </p:spPr>
+                  <p:style>
+                    <a:lnRef idx="2">
+                      <a:schemeClr val="accent1">
+                        <a:shade val="50000"/>
+                      </a:schemeClr>
+                    </a:lnRef>
+                    <a:fillRef idx="1">
+                      <a:schemeClr val="accent1"/>
+                    </a:fillRef>
+                    <a:effectRef idx="0">
+                      <a:schemeClr val="accent1"/>
+                    </a:effectRef>
+                    <a:fontRef idx="minor">
+                      <a:schemeClr val="lt1"/>
+                    </a:fontRef>
+                  </p:style>
+                  <p:txBody>
+                    <a:bodyPr rtlCol="0" anchor="ctr"/>
+                    <a:lstStyle/>
+                    <a:p>
+                      <a:pPr algn="ctr"/>
+                      <a:endParaRPr lang="zh-TW" altLang="en-US"/>
+                    </a:p>
+                  </p:txBody>
+                </p:sp>
+                <p:sp>
+                  <p:nvSpPr>
+                    <p:cNvPr id="131" name="矩形 130">
+                      <a:extLst>
+                        <a:ext uri="{FF2B5EF4-FFF2-40B4-BE49-F238E27FC236}">
+                          <a16:creationId xmlns:a16="http://schemas.microsoft.com/office/drawing/2014/main" id="{41863CFE-4BA2-4225-9D2E-0E599B1B0B92}"/>
+                        </a:ext>
+                      </a:extLst>
+                    </p:cNvPr>
+                    <p:cNvSpPr/>
+                    <p:nvPr/>
+                  </p:nvSpPr>
+                  <p:spPr>
+                    <a:xfrm>
+                      <a:off x="8282738" y="3940374"/>
+                      <a:ext cx="248737" cy="2574876"/>
+                    </a:xfrm>
+                    <a:prstGeom prst="rect">
+                      <a:avLst/>
+                    </a:prstGeom>
+                    <a:solidFill>
+                      <a:schemeClr val="accent4"/>
+                    </a:solidFill>
+                    <a:ln>
+                      <a:noFill/>
+                    </a:ln>
+                  </p:spPr>
+                  <p:style>
+                    <a:lnRef idx="2">
+                      <a:schemeClr val="accent1">
+                        <a:shade val="50000"/>
+                      </a:schemeClr>
+                    </a:lnRef>
+                    <a:fillRef idx="1">
+                      <a:schemeClr val="accent1"/>
+                    </a:fillRef>
+                    <a:effectRef idx="0">
+                      <a:schemeClr val="accent1"/>
+                    </a:effectRef>
+                    <a:fontRef idx="minor">
+                      <a:schemeClr val="lt1"/>
+                    </a:fontRef>
+                  </p:style>
+                  <p:txBody>
+                    <a:bodyPr rtlCol="0" anchor="ctr"/>
+                    <a:lstStyle/>
+                    <a:p>
+                      <a:pPr algn="ctr"/>
+                      <a:endParaRPr lang="zh-TW" altLang="en-US"/>
+                    </a:p>
+                  </p:txBody>
+                </p:sp>
+              </p:grpSp>
+            </p:grpSp>
+            <p:grpSp>
+              <p:nvGrpSpPr>
+                <p:cNvPr id="125" name="群組 124">
+                  <a:extLst>
+                    <a:ext uri="{FF2B5EF4-FFF2-40B4-BE49-F238E27FC236}">
+                      <a16:creationId xmlns:a16="http://schemas.microsoft.com/office/drawing/2014/main" id="{110C22EF-3D61-4522-B17D-7CB87C967B60}"/>
+                    </a:ext>
+                  </a:extLst>
+                </p:cNvPr>
+                <p:cNvGrpSpPr/>
+                <p:nvPr/>
+              </p:nvGrpSpPr>
+              <p:grpSpPr>
+                <a:xfrm>
+                  <a:off x="9514706" y="-2813887"/>
+                  <a:ext cx="252440" cy="5149583"/>
+                  <a:chOff x="8290146" y="1365918"/>
+                  <a:chExt cx="252440" cy="5149583"/>
+                </a:xfrm>
+              </p:grpSpPr>
+              <p:sp>
+                <p:nvSpPr>
+                  <p:cNvPr id="126" name="矩形 125">
+                    <a:extLst>
+                      <a:ext uri="{FF2B5EF4-FFF2-40B4-BE49-F238E27FC236}">
+                        <a16:creationId xmlns:a16="http://schemas.microsoft.com/office/drawing/2014/main" id="{6FD20A59-D75A-48B6-958E-382792A42D09}"/>
+                      </a:ext>
+                    </a:extLst>
+                  </p:cNvPr>
+                  <p:cNvSpPr/>
+                  <p:nvPr/>
+                </p:nvSpPr>
+                <p:spPr>
+                  <a:xfrm>
+                    <a:off x="8293849" y="1365918"/>
+                    <a:ext cx="248737" cy="2574874"/>
+                  </a:xfrm>
+                  <a:prstGeom prst="rect">
+                    <a:avLst/>
+                  </a:prstGeom>
+                  <a:solidFill>
+                    <a:schemeClr val="accent4"/>
+                  </a:solidFill>
+                  <a:ln>
+                    <a:solidFill>
+                      <a:schemeClr val="bg2"/>
+                    </a:solidFill>
+                  </a:ln>
+                </p:spPr>
+                <p:style>
+                  <a:lnRef idx="2">
+                    <a:schemeClr val="accent1">
+                      <a:shade val="50000"/>
+                    </a:schemeClr>
+                  </a:lnRef>
+                  <a:fillRef idx="1">
+                    <a:schemeClr val="accent1"/>
+                  </a:fillRef>
+                  <a:effectRef idx="0">
+                    <a:schemeClr val="accent1"/>
+                  </a:effectRef>
+                  <a:fontRef idx="minor">
+                    <a:schemeClr val="lt1"/>
+                  </a:fontRef>
+                </p:style>
+                <p:txBody>
+                  <a:bodyPr rtlCol="0" anchor="ctr"/>
+                  <a:lstStyle/>
+                  <a:p>
+                    <a:pPr algn="ctr"/>
+                    <a:endParaRPr lang="zh-TW" altLang="en-US"/>
+                  </a:p>
+                </p:txBody>
+              </p:sp>
+              <p:sp>
+                <p:nvSpPr>
+                  <p:cNvPr id="127" name="矩形 126">
+                    <a:extLst>
+                      <a:ext uri="{FF2B5EF4-FFF2-40B4-BE49-F238E27FC236}">
+                        <a16:creationId xmlns:a16="http://schemas.microsoft.com/office/drawing/2014/main" id="{35EC2237-7BAC-4099-ABE4-9908DDB3D94C}"/>
+                      </a:ext>
+                    </a:extLst>
+                  </p:cNvPr>
+                  <p:cNvSpPr/>
+                  <p:nvPr/>
+                </p:nvSpPr>
+                <p:spPr>
+                  <a:xfrm>
+                    <a:off x="8290146" y="3940627"/>
+                    <a:ext cx="248737" cy="2574874"/>
+                  </a:xfrm>
+                  <a:prstGeom prst="rect">
+                    <a:avLst/>
+                  </a:prstGeom>
+                  <a:solidFill>
+                    <a:schemeClr val="accent4"/>
+                  </a:solidFill>
+                  <a:ln>
+                    <a:noFill/>
+                  </a:ln>
+                </p:spPr>
+                <p:style>
+                  <a:lnRef idx="2">
+                    <a:schemeClr val="accent1">
+                      <a:shade val="50000"/>
+                    </a:schemeClr>
+                  </a:lnRef>
+                  <a:fillRef idx="1">
+                    <a:schemeClr val="accent1"/>
+                  </a:fillRef>
+                  <a:effectRef idx="0">
+                    <a:schemeClr val="accent1"/>
+                  </a:effectRef>
+                  <a:fontRef idx="minor">
+                    <a:schemeClr val="lt1"/>
+                  </a:fontRef>
+                </p:style>
+                <p:txBody>
+                  <a:bodyPr rtlCol="0" anchor="ctr"/>
+                  <a:lstStyle/>
+                  <a:p>
+                    <a:pPr algn="ctr"/>
+                    <a:endParaRPr lang="zh-TW" altLang="en-US"/>
+                  </a:p>
+                </p:txBody>
+              </p:sp>
+            </p:grpSp>
+          </p:grpSp>
+        </p:grpSp>
+        <p:grpSp>
+          <p:nvGrpSpPr>
+            <p:cNvPr id="111" name="群組 110">
+              <a:extLst>
+                <a:ext uri="{FF2B5EF4-FFF2-40B4-BE49-F238E27FC236}">
+                  <a16:creationId xmlns:a16="http://schemas.microsoft.com/office/drawing/2014/main" id="{E16E4381-4395-4255-B596-EC58DFEB1A42}"/>
+                </a:ext>
+              </a:extLst>
+            </p:cNvPr>
+            <p:cNvGrpSpPr/>
+            <p:nvPr/>
+          </p:nvGrpSpPr>
+          <p:grpSpPr>
+            <a:xfrm>
+              <a:off x="9406437" y="-9225868"/>
+              <a:ext cx="250761" cy="15448915"/>
+              <a:chOff x="9466840" y="-2813718"/>
+              <a:chExt cx="250761" cy="15448915"/>
+            </a:xfrm>
+          </p:grpSpPr>
+          <p:grpSp>
+            <p:nvGrpSpPr>
+              <p:cNvPr id="112" name="群組 111">
+                <a:extLst>
+                  <a:ext uri="{FF2B5EF4-FFF2-40B4-BE49-F238E27FC236}">
+                    <a16:creationId xmlns:a16="http://schemas.microsoft.com/office/drawing/2014/main" id="{11020A09-3507-4952-BAD6-7C60A6677610}"/>
+                  </a:ext>
+                </a:extLst>
+              </p:cNvPr>
+              <p:cNvGrpSpPr/>
+              <p:nvPr/>
+            </p:nvGrpSpPr>
+            <p:grpSpPr>
+              <a:xfrm>
+                <a:off x="9466841" y="2337342"/>
+                <a:ext cx="250760" cy="10297855"/>
+                <a:chOff x="7988402" y="-6700985"/>
+                <a:chExt cx="250760" cy="10297855"/>
+              </a:xfrm>
+            </p:grpSpPr>
+            <p:grpSp>
+              <p:nvGrpSpPr>
+                <p:cNvPr id="116" name="群組 115">
+                  <a:extLst>
+                    <a:ext uri="{FF2B5EF4-FFF2-40B4-BE49-F238E27FC236}">
+                      <a16:creationId xmlns:a16="http://schemas.microsoft.com/office/drawing/2014/main" id="{FD6B3DB1-B972-4775-9132-C4A0D3CAE8DD}"/>
+                    </a:ext>
+                  </a:extLst>
+                </p:cNvPr>
+                <p:cNvGrpSpPr/>
+                <p:nvPr/>
+              </p:nvGrpSpPr>
+              <p:grpSpPr>
+                <a:xfrm>
+                  <a:off x="7988403" y="-1551893"/>
+                  <a:ext cx="248737" cy="5148763"/>
+                  <a:chOff x="8242280" y="1367397"/>
+                  <a:chExt cx="248737" cy="5148763"/>
+                </a:xfrm>
+              </p:grpSpPr>
+              <p:sp>
+                <p:nvSpPr>
+                  <p:cNvPr id="120" name="矩形 119">
+                    <a:extLst>
+                      <a:ext uri="{FF2B5EF4-FFF2-40B4-BE49-F238E27FC236}">
+                        <a16:creationId xmlns:a16="http://schemas.microsoft.com/office/drawing/2014/main" id="{16828643-07D4-4723-91A0-639BEE295A01}"/>
+                      </a:ext>
+                    </a:extLst>
+                  </p:cNvPr>
+                  <p:cNvSpPr/>
+                  <p:nvPr/>
+                </p:nvSpPr>
+                <p:spPr>
+                  <a:xfrm>
+                    <a:off x="8242280" y="1367397"/>
+                    <a:ext cx="248737" cy="2574875"/>
+                  </a:xfrm>
+                  <a:prstGeom prst="rect">
+                    <a:avLst/>
+                  </a:prstGeom>
+                  <a:solidFill>
+                    <a:schemeClr val="accent4"/>
+                  </a:solidFill>
+                  <a:ln>
+                    <a:solidFill>
+                      <a:schemeClr val="bg2"/>
+                    </a:solidFill>
+                  </a:ln>
+                </p:spPr>
+                <p:style>
+                  <a:lnRef idx="2">
+                    <a:schemeClr val="accent1">
+                      <a:shade val="50000"/>
+                    </a:schemeClr>
+                  </a:lnRef>
+                  <a:fillRef idx="1">
+                    <a:schemeClr val="accent1"/>
+                  </a:fillRef>
+                  <a:effectRef idx="0">
+                    <a:schemeClr val="accent1"/>
+                  </a:effectRef>
+                  <a:fontRef idx="minor">
+                    <a:schemeClr val="lt1"/>
+                  </a:fontRef>
+                </p:style>
+                <p:txBody>
+                  <a:bodyPr rtlCol="0" anchor="ctr"/>
+                  <a:lstStyle/>
+                  <a:p>
+                    <a:pPr algn="ctr"/>
+                    <a:endParaRPr lang="zh-TW" altLang="en-US"/>
+                  </a:p>
+                </p:txBody>
+              </p:sp>
+              <p:sp>
+                <p:nvSpPr>
+                  <p:cNvPr id="121" name="矩形 120">
+                    <a:extLst>
+                      <a:ext uri="{FF2B5EF4-FFF2-40B4-BE49-F238E27FC236}">
+                        <a16:creationId xmlns:a16="http://schemas.microsoft.com/office/drawing/2014/main" id="{8DF082AF-E69C-4119-A736-A19496FFB22B}"/>
+                      </a:ext>
+                    </a:extLst>
+                  </p:cNvPr>
+                  <p:cNvSpPr/>
+                  <p:nvPr/>
+                </p:nvSpPr>
+                <p:spPr>
+                  <a:xfrm>
+                    <a:off x="8242280" y="3941284"/>
+                    <a:ext cx="248737" cy="2574876"/>
+                  </a:xfrm>
+                  <a:prstGeom prst="rect">
+                    <a:avLst/>
+                  </a:prstGeom>
+                  <a:solidFill>
+                    <a:schemeClr val="accent4"/>
+                  </a:solidFill>
+                  <a:ln>
+                    <a:noFill/>
+                  </a:ln>
+                </p:spPr>
+                <p:style>
+                  <a:lnRef idx="2">
+                    <a:schemeClr val="accent1">
+                      <a:shade val="50000"/>
+                    </a:schemeClr>
+                  </a:lnRef>
+                  <a:fillRef idx="1">
+                    <a:schemeClr val="accent1"/>
+                  </a:fillRef>
+                  <a:effectRef idx="0">
+                    <a:schemeClr val="accent1"/>
+                  </a:effectRef>
+                  <a:fontRef idx="minor">
+                    <a:schemeClr val="lt1"/>
+                  </a:fontRef>
+                </p:style>
+                <p:txBody>
+                  <a:bodyPr rtlCol="0" anchor="ctr"/>
+                  <a:lstStyle/>
+                  <a:p>
+                    <a:pPr algn="ctr"/>
+                    <a:endParaRPr lang="zh-TW" altLang="en-US"/>
+                  </a:p>
+                </p:txBody>
+              </p:sp>
+            </p:grpSp>
+            <p:grpSp>
+              <p:nvGrpSpPr>
+                <p:cNvPr id="117" name="群組 116">
+                  <a:extLst>
+                    <a:ext uri="{FF2B5EF4-FFF2-40B4-BE49-F238E27FC236}">
+                      <a16:creationId xmlns:a16="http://schemas.microsoft.com/office/drawing/2014/main" id="{DBBFEB40-3FA2-42A8-993F-44E40F680C6C}"/>
+                    </a:ext>
+                  </a:extLst>
+                </p:cNvPr>
+                <p:cNvGrpSpPr/>
+                <p:nvPr/>
+              </p:nvGrpSpPr>
+              <p:grpSpPr>
+                <a:xfrm>
+                  <a:off x="7988402" y="-6700985"/>
+                  <a:ext cx="250760" cy="5148273"/>
+                  <a:chOff x="8242280" y="1367397"/>
+                  <a:chExt cx="250760" cy="5148273"/>
+                </a:xfrm>
+              </p:grpSpPr>
+              <p:sp>
+                <p:nvSpPr>
+                  <p:cNvPr id="118" name="矩形 117">
+                    <a:extLst>
+                      <a:ext uri="{FF2B5EF4-FFF2-40B4-BE49-F238E27FC236}">
+                        <a16:creationId xmlns:a16="http://schemas.microsoft.com/office/drawing/2014/main" id="{F6C83970-A1BD-4922-9F9B-ECC5A27640B0}"/>
+                      </a:ext>
+                    </a:extLst>
+                  </p:cNvPr>
+                  <p:cNvSpPr/>
+                  <p:nvPr/>
+                </p:nvSpPr>
+                <p:spPr>
+                  <a:xfrm>
+                    <a:off x="8242280" y="1367397"/>
+                    <a:ext cx="248737" cy="2574875"/>
+                  </a:xfrm>
+                  <a:prstGeom prst="rect">
+                    <a:avLst/>
+                  </a:prstGeom>
+                  <a:solidFill>
+                    <a:schemeClr val="accent4"/>
+                  </a:solidFill>
+                  <a:ln>
+                    <a:solidFill>
+                      <a:schemeClr val="bg2"/>
+                    </a:solidFill>
+                  </a:ln>
+                </p:spPr>
+                <p:style>
+                  <a:lnRef idx="2">
+                    <a:schemeClr val="accent1">
+                      <a:shade val="50000"/>
+                    </a:schemeClr>
+                  </a:lnRef>
+                  <a:fillRef idx="1">
+                    <a:schemeClr val="accent1"/>
+                  </a:fillRef>
+                  <a:effectRef idx="0">
+                    <a:schemeClr val="accent1"/>
+                  </a:effectRef>
+                  <a:fontRef idx="minor">
+                    <a:schemeClr val="lt1"/>
+                  </a:fontRef>
+                </p:style>
+                <p:txBody>
+                  <a:bodyPr rtlCol="0" anchor="ctr"/>
+                  <a:lstStyle/>
+                  <a:p>
+                    <a:pPr algn="ctr"/>
+                    <a:endParaRPr lang="zh-TW" altLang="en-US"/>
+                  </a:p>
+                </p:txBody>
+              </p:sp>
+              <p:sp>
+                <p:nvSpPr>
+                  <p:cNvPr id="119" name="矩形 118">
+                    <a:extLst>
+                      <a:ext uri="{FF2B5EF4-FFF2-40B4-BE49-F238E27FC236}">
+                        <a16:creationId xmlns:a16="http://schemas.microsoft.com/office/drawing/2014/main" id="{9490C8B7-CB0D-4073-A172-94DEB03CA031}"/>
+                      </a:ext>
+                    </a:extLst>
+                  </p:cNvPr>
+                  <p:cNvSpPr/>
+                  <p:nvPr/>
+                </p:nvSpPr>
+                <p:spPr>
+                  <a:xfrm>
+                    <a:off x="8244303" y="3940796"/>
+                    <a:ext cx="248737" cy="2574874"/>
+                  </a:xfrm>
+                  <a:prstGeom prst="rect">
+                    <a:avLst/>
+                  </a:prstGeom>
+                  <a:solidFill>
+                    <a:schemeClr val="accent4"/>
+                  </a:solidFill>
+                  <a:ln>
+                    <a:noFill/>
+                  </a:ln>
+                </p:spPr>
+                <p:style>
+                  <a:lnRef idx="2">
+                    <a:schemeClr val="accent1">
+                      <a:shade val="50000"/>
+                    </a:schemeClr>
+                  </a:lnRef>
+                  <a:fillRef idx="1">
+                    <a:schemeClr val="accent1"/>
+                  </a:fillRef>
+                  <a:effectRef idx="0">
+                    <a:schemeClr val="accent1"/>
+                  </a:effectRef>
+                  <a:fontRef idx="minor">
+                    <a:schemeClr val="lt1"/>
+                  </a:fontRef>
+                </p:style>
+                <p:txBody>
+                  <a:bodyPr rtlCol="0" anchor="ctr"/>
+                  <a:lstStyle/>
+                  <a:p>
+                    <a:pPr algn="ctr"/>
+                    <a:endParaRPr lang="zh-TW" altLang="en-US"/>
+                  </a:p>
+                </p:txBody>
+              </p:sp>
+            </p:grpSp>
+          </p:grpSp>
+          <p:grpSp>
+            <p:nvGrpSpPr>
+              <p:cNvPr id="113" name="群組 112">
+                <a:extLst>
+                  <a:ext uri="{FF2B5EF4-FFF2-40B4-BE49-F238E27FC236}">
+                    <a16:creationId xmlns:a16="http://schemas.microsoft.com/office/drawing/2014/main" id="{67E8EB13-6199-46CB-B729-37ECF73387F7}"/>
+                  </a:ext>
+                </a:extLst>
+              </p:cNvPr>
+              <p:cNvGrpSpPr/>
+              <p:nvPr/>
+            </p:nvGrpSpPr>
+            <p:grpSpPr>
+              <a:xfrm>
+                <a:off x="9466840" y="-2813718"/>
+                <a:ext cx="248737" cy="5150402"/>
+                <a:chOff x="8242280" y="1366087"/>
+                <a:chExt cx="248737" cy="5150402"/>
+              </a:xfrm>
+            </p:grpSpPr>
+            <p:sp>
+              <p:nvSpPr>
+                <p:cNvPr id="114" name="矩形 113">
+                  <a:extLst>
+                    <a:ext uri="{FF2B5EF4-FFF2-40B4-BE49-F238E27FC236}">
+                      <a16:creationId xmlns:a16="http://schemas.microsoft.com/office/drawing/2014/main" id="{C4E18018-1713-4DE9-9F64-D48D833E26C2}"/>
+                    </a:ext>
+                  </a:extLst>
+                </p:cNvPr>
+                <p:cNvSpPr/>
+                <p:nvPr/>
+              </p:nvSpPr>
+              <p:spPr>
+                <a:xfrm>
+                  <a:off x="8242280" y="1366087"/>
+                  <a:ext cx="248737" cy="2574874"/>
+                </a:xfrm>
+                <a:prstGeom prst="rect">
+                  <a:avLst/>
+                </a:prstGeom>
+                <a:solidFill>
+                  <a:schemeClr val="accent4"/>
+                </a:solidFill>
+                <a:ln>
+                  <a:solidFill>
+                    <a:schemeClr val="bg2"/>
+                  </a:solidFill>
+                </a:ln>
+              </p:spPr>
+              <p:style>
+                <a:lnRef idx="2">
+                  <a:schemeClr val="accent1">
+                    <a:shade val="50000"/>
+                  </a:schemeClr>
+                </a:lnRef>
+                <a:fillRef idx="1">
+                  <a:schemeClr val="accent1"/>
+                </a:fillRef>
+                <a:effectRef idx="0">
+                  <a:schemeClr val="accent1"/>
+                </a:effectRef>
+                <a:fontRef idx="minor">
+                  <a:schemeClr val="lt1"/>
+                </a:fontRef>
+              </p:style>
+              <p:txBody>
+                <a:bodyPr rtlCol="0" anchor="ctr"/>
+                <a:lstStyle/>
+                <a:p>
+                  <a:pPr algn="ctr"/>
+                  <a:endParaRPr lang="zh-TW" altLang="en-US"/>
+                </a:p>
+              </p:txBody>
+            </p:sp>
+            <p:sp>
+              <p:nvSpPr>
+                <p:cNvPr id="115" name="矩形 114">
+                  <a:extLst>
+                    <a:ext uri="{FF2B5EF4-FFF2-40B4-BE49-F238E27FC236}">
+                      <a16:creationId xmlns:a16="http://schemas.microsoft.com/office/drawing/2014/main" id="{9CD2ED89-5E96-4539-BF40-F47408190076}"/>
+                    </a:ext>
+                  </a:extLst>
+                </p:cNvPr>
+                <p:cNvSpPr/>
+                <p:nvPr/>
+              </p:nvSpPr>
+              <p:spPr>
+                <a:xfrm>
+                  <a:off x="8242280" y="3941614"/>
+                  <a:ext cx="248737" cy="2574875"/>
+                </a:xfrm>
+                <a:prstGeom prst="rect">
+                  <a:avLst/>
+                </a:prstGeom>
+                <a:solidFill>
+                  <a:schemeClr val="accent4"/>
+                </a:solidFill>
+                <a:ln>
+                  <a:noFill/>
+                </a:ln>
+              </p:spPr>
+              <p:style>
+                <a:lnRef idx="2">
+                  <a:schemeClr val="accent1">
+                    <a:shade val="50000"/>
+                  </a:schemeClr>
+                </a:lnRef>
+                <a:fillRef idx="1">
+                  <a:schemeClr val="accent1"/>
+                </a:fillRef>
+                <a:effectRef idx="0">
+                  <a:schemeClr val="accent1"/>
+                </a:effectRef>
+                <a:fontRef idx="minor">
+                  <a:schemeClr val="lt1"/>
+                </a:fontRef>
+              </p:style>
+              <p:txBody>
+                <a:bodyPr rtlCol="0" anchor="ctr"/>
+                <a:lstStyle/>
+                <a:p>
+                  <a:pPr algn="ctr"/>
+                  <a:endParaRPr lang="zh-TW" altLang="en-US"/>
+                </a:p>
+              </p:txBody>
+            </p:sp>
+          </p:grpSp>
+        </p:grpSp>
+      </p:grpSp>
     </p:spTree>
     <p:extLst>
       <p:ext uri="{BB962C8B-B14F-4D97-AF65-F5344CB8AC3E}">

</xml_diff>